<commit_message>
docs: updates to Sprint 1 Presentation slides
</commit_message>
<xml_diff>
--- a/project-docs/Sprint-1-Presentation.pptx
+++ b/project-docs/Sprint-1-Presentation.pptx
@@ -9,9 +9,9 @@
     <p:sldId id="257" r:id="rId3"/>
     <p:sldId id="258" r:id="rId4"/>
     <p:sldId id="259" r:id="rId5"/>
-    <p:sldId id="260" r:id="rId6"/>
-    <p:sldId id="261" r:id="rId7"/>
-    <p:sldId id="262" r:id="rId8"/>
+    <p:sldId id="264" r:id="rId6"/>
+    <p:sldId id="260" r:id="rId7"/>
+    <p:sldId id="261" r:id="rId8"/>
     <p:sldId id="263" r:id="rId9"/>
   </p:sldIdLst>
   <p:sldSz cx="12192000" cy="6858000"/>
@@ -2591,7 +2591,7 @@
         <a:lstStyle/>
         <a:p>
           <a:r>
-            <a:rPr lang="en-US"/>
+            <a:rPr lang="en-US" dirty="0"/>
             <a:t>Epics:</a:t>
           </a:r>
         </a:p>
@@ -2620,17 +2620,21 @@
       </dgm:t>
     </dgm:pt>
     <dgm:pt modelId="{0C59BDD1-F763-47C5-A192-7AB7A60C29FB}">
-      <dgm:prSet/>
+      <dgm:prSet custT="1"/>
       <dgm:spPr/>
       <dgm:t>
         <a:bodyPr/>
         <a:lstStyle/>
         <a:p>
           <a:r>
-            <a:rPr lang="en-US" b="0" i="1" baseline="0"/>
-            <a:t>Epic 1 TBD</a:t>
+            <a:rPr lang="en-US" sz="1600" b="1" i="0" baseline="0" dirty="0"/>
+            <a:t>Epic 1</a:t>
           </a:r>
-          <a:endParaRPr lang="en-US"/>
+          <a:r>
+            <a:rPr lang="en-US" sz="1600" b="0" i="0" baseline="0" dirty="0"/>
+            <a:t> I am a user who wishes to use an image to detect skin cancer so that I receive information about my condition</a:t>
+          </a:r>
+          <a:endParaRPr lang="en-US" sz="1600" i="0" dirty="0"/>
         </a:p>
       </dgm:t>
     </dgm:pt>
@@ -2657,17 +2661,21 @@
       </dgm:t>
     </dgm:pt>
     <dgm:pt modelId="{341EC042-ADB2-414B-8AD6-16416588C39C}">
-      <dgm:prSet/>
+      <dgm:prSet custT="1"/>
       <dgm:spPr/>
       <dgm:t>
         <a:bodyPr/>
         <a:lstStyle/>
         <a:p>
           <a:r>
-            <a:rPr lang="en-US" b="0" i="1" baseline="0"/>
-            <a:t>Epic 2 TBD</a:t>
+            <a:rPr lang="en-US" sz="1600" b="1" i="0" baseline="0" dirty="0"/>
+            <a:t>Epic 2</a:t>
           </a:r>
-          <a:endParaRPr lang="en-US"/>
+          <a:r>
+            <a:rPr lang="en-US" sz="1600" b="0" i="0" baseline="0" dirty="0"/>
+            <a:t> TBD</a:t>
+          </a:r>
+          <a:endParaRPr lang="en-US" sz="1600" i="0" dirty="0"/>
         </a:p>
       </dgm:t>
     </dgm:pt>
@@ -2701,7 +2709,7 @@
         <a:lstStyle/>
         <a:p>
           <a:r>
-            <a:rPr lang="en-US"/>
+            <a:rPr lang="en-US" dirty="0"/>
             <a:t>Stories:</a:t>
           </a:r>
         </a:p>
@@ -2730,17 +2738,21 @@
       </dgm:t>
     </dgm:pt>
     <dgm:pt modelId="{BA0AB2D0-849C-400F-8F80-D81332DB5760}">
-      <dgm:prSet/>
+      <dgm:prSet custT="1"/>
       <dgm:spPr/>
       <dgm:t>
         <a:bodyPr/>
         <a:lstStyle/>
         <a:p>
           <a:r>
-            <a:rPr lang="en-US" b="0" i="1" baseline="0" dirty="0"/>
-            <a:t>Story 1 TBD</a:t>
+            <a:rPr lang="en-US" sz="1600" b="1" i="0" baseline="0" dirty="0"/>
+            <a:t>Story 1 </a:t>
           </a:r>
-          <a:endParaRPr lang="en-US" i="1" dirty="0"/>
+          <a:r>
+            <a:rPr lang="en-US" sz="1600" b="0" i="0" baseline="0" dirty="0"/>
+            <a:t>As a developer, I need a sequence to preprocess images (resize, normalize), so they are formatted correctly for the ML model</a:t>
+          </a:r>
+          <a:endParaRPr lang="en-US" sz="1600" i="0" dirty="0"/>
         </a:p>
       </dgm:t>
     </dgm:pt>
@@ -2767,17 +2779,21 @@
       </dgm:t>
     </dgm:pt>
     <dgm:pt modelId="{15FD39A6-2484-4198-9133-6DACC7DF0C1D}">
-      <dgm:prSet/>
+      <dgm:prSet custT="1"/>
       <dgm:spPr/>
       <dgm:t>
         <a:bodyPr/>
         <a:lstStyle/>
         <a:p>
           <a:r>
-            <a:rPr lang="en-US" b="0" i="1" baseline="0" dirty="0"/>
-            <a:t>Story 2 TBD	</a:t>
+            <a:rPr lang="en-US" sz="1600" b="1" i="0" baseline="0" dirty="0"/>
+            <a:t>Story 2 </a:t>
           </a:r>
-          <a:endParaRPr lang="en-US" i="1" dirty="0"/>
+          <a:r>
+            <a:rPr lang="en-US" sz="1600" b="0" i="0" baseline="0" dirty="0"/>
+            <a:t>As a backend developer, I need to provide backend calls that execute the ML model, so that the frontend can make the proper calls to the backend. 	</a:t>
+          </a:r>
+          <a:endParaRPr lang="en-US" sz="1600" i="0" dirty="0"/>
         </a:p>
       </dgm:t>
     </dgm:pt>
@@ -2804,17 +2820,21 @@
       </dgm:t>
     </dgm:pt>
     <dgm:pt modelId="{032E1CCB-BB7A-40A2-9254-9620D22A67E1}">
-      <dgm:prSet/>
+      <dgm:prSet custT="1"/>
       <dgm:spPr/>
       <dgm:t>
         <a:bodyPr/>
         <a:lstStyle/>
         <a:p>
           <a:r>
-            <a:rPr lang="en-US" b="0" i="1" baseline="0" dirty="0"/>
-            <a:t>Story 3 TBD</a:t>
+            <a:rPr lang="en-US" sz="1600" b="1" i="0" baseline="0" dirty="0"/>
+            <a:t>Story 3 </a:t>
           </a:r>
-          <a:endParaRPr lang="en-US" i="1" dirty="0"/>
+          <a:r>
+            <a:rPr lang="en-US" sz="1600" b="0" i="0" baseline="0" dirty="0"/>
+            <a:t>As a user, I want to upload a clear image of the affected skin area so that I can receive an instant diagnosis.</a:t>
+          </a:r>
+          <a:endParaRPr lang="en-US" sz="1600" b="0" i="0" dirty="0"/>
         </a:p>
       </dgm:t>
     </dgm:pt>
@@ -2841,21 +2861,29 @@
       </dgm:t>
     </dgm:pt>
     <dgm:pt modelId="{08DDA11F-9BCC-4B10-A1B2-55115E2DF4F3}">
-      <dgm:prSet/>
+      <dgm:prSet custT="1"/>
       <dgm:spPr/>
       <dgm:t>
         <a:bodyPr/>
         <a:lstStyle/>
         <a:p>
           <a:r>
-            <a:rPr lang="en-US" b="0" i="1" baseline="0" dirty="0"/>
-            <a:t>Story 4 TBD</a:t>
+            <a:rPr lang="en-US" sz="1600" b="1" i="0" baseline="0" dirty="0"/>
+            <a:t>Story 4</a:t>
+          </a:r>
+          <a:r>
+            <a:rPr lang="en-US" sz="1600" b="0" i="0" baseline="0" dirty="0"/>
+            <a:t> As a user, I want to download the analysis results, so I can share them with my health team</a:t>
           </a:r>
         </a:p>
         <a:p>
           <a:r>
-            <a:rPr lang="en-US" i="1" dirty="0"/>
-            <a:t>Story 5 TBD </a:t>
+            <a:rPr lang="en-US" sz="1600" b="1" i="0" dirty="0"/>
+            <a:t>Story 5 </a:t>
+          </a:r>
+          <a:r>
+            <a:rPr lang="en-US" sz="1600" b="0" i="0" dirty="0"/>
+            <a:t>As a user, I want to view or download the analysis results, so I can share them with my health team</a:t>
           </a:r>
         </a:p>
       </dgm:t>
@@ -2922,7 +2950,7 @@
       <dgm:spPr/>
     </dgm:pt>
     <dgm:pt modelId="{32692678-0BF9-CA44-8122-045FA0B2AEC7}" type="pres">
-      <dgm:prSet presAssocID="{17762AFB-C8D8-433A-8E0C-870383DE9A3B}" presName="parentText" presStyleLbl="alignNode1" presStyleIdx="1" presStyleCnt="2">
+      <dgm:prSet presAssocID="{17762AFB-C8D8-433A-8E0C-870383DE9A3B}" presName="parentText" presStyleLbl="alignNode1" presStyleIdx="1" presStyleCnt="2" custScaleY="198345">
         <dgm:presLayoutVars>
           <dgm:chMax val="1"/>
           <dgm:bulletEnabled/>
@@ -2931,7 +2959,7 @@
       <dgm:spPr/>
     </dgm:pt>
     <dgm:pt modelId="{B81F0CC9-04FE-B346-AAE8-3334BD1A1448}" type="pres">
-      <dgm:prSet presAssocID="{17762AFB-C8D8-433A-8E0C-870383DE9A3B}" presName="descendantText" presStyleLbl="alignAccFollowNode1" presStyleIdx="1" presStyleCnt="2">
+      <dgm:prSet presAssocID="{17762AFB-C8D8-433A-8E0C-870383DE9A3B}" presName="descendantText" presStyleLbl="alignAccFollowNode1" presStyleIdx="1" presStyleCnt="2" custScaleY="200526">
         <dgm:presLayoutVars>
           <dgm:bulletEnabled/>
         </dgm:presLayoutVars>
@@ -2990,17 +3018,17 @@
       </dgm:t>
     </dgm:pt>
     <dgm:pt modelId="{71EE360D-1390-41E2-91DE-B360117B76EF}">
-      <dgm:prSet/>
+      <dgm:prSet custT="1"/>
       <dgm:spPr/>
       <dgm:t>
         <a:bodyPr/>
         <a:lstStyle/>
         <a:p>
           <a:r>
-            <a:rPr lang="en-US" b="1" dirty="0"/>
+            <a:rPr lang="en-US" sz="1800" b="1" dirty="0"/>
             <a:t>Sprint 2:</a:t>
           </a:r>
-          <a:endParaRPr lang="en-US" dirty="0"/>
+          <a:endParaRPr lang="en-US" sz="1800" dirty="0"/>
         </a:p>
       </dgm:t>
     </dgm:pt>
@@ -3038,8 +3066,12 @@
             <a:buChar char="•"/>
           </a:pPr>
           <a:r>
-            <a:rPr lang="en-US" dirty="0"/>
-            <a:t>Item 1 TBD </a:t>
+            <a:rPr lang="en-US" b="1" dirty="0"/>
+            <a:t>Item 1</a:t>
+          </a:r>
+          <a:r>
+            <a:rPr lang="en-US" b="0" dirty="0"/>
+            <a:t> Determine the required input size for your ML model</a:t>
           </a:r>
         </a:p>
       </dgm:t>
@@ -3077,8 +3109,16 @@
             <a:buNone/>
           </a:pPr>
           <a:r>
+            <a:rPr lang="en-US" b="1" dirty="0"/>
+            <a:t>Item 2 </a:t>
+          </a:r>
+          <a:r>
+            <a:rPr lang="en-US" b="0" dirty="0"/>
+            <a:t>Identify datasets from where we can fetch the images for training the ML model</a:t>
+          </a:r>
+          <a:r>
             <a:rPr lang="en-US" dirty="0"/>
-            <a:t>Item 2 TBD</a:t>
+            <a:t> </a:t>
           </a:r>
         </a:p>
       </dgm:t>
@@ -3116,8 +3156,12 @@
             <a:buNone/>
           </a:pPr>
           <a:r>
-            <a:rPr lang="en-US" dirty="0"/>
-            <a:t>Item 3 TBD</a:t>
+            <a:rPr lang="en-US" b="1" dirty="0"/>
+            <a:t>Item 3 </a:t>
+          </a:r>
+          <a:r>
+            <a:rPr lang="en-US" b="0" dirty="0"/>
+            <a:t>Convert images to the required color space</a:t>
           </a:r>
         </a:p>
         <a:p>
@@ -3125,8 +3169,51 @@
             <a:buNone/>
           </a:pPr>
           <a:r>
-            <a:rPr lang="en-US" dirty="0"/>
-            <a:t>Item 4 TBD</a:t>
+            <a:rPr lang="en-US" b="1" dirty="0"/>
+            <a:t>Item 4 </a:t>
+          </a:r>
+          <a:r>
+            <a:rPr lang="en-US" b="0" dirty="0"/>
+            <a:t>Implement an image augmentation pipeline to improve model generalization.</a:t>
+          </a:r>
+        </a:p>
+        <a:p>
+          <a:pPr>
+            <a:buNone/>
+          </a:pPr>
+          <a:r>
+            <a:rPr lang="en-US" b="1" dirty="0"/>
+            <a:t>Item 5 </a:t>
+          </a:r>
+          <a:r>
+            <a:rPr lang="en-US" b="0" dirty="0"/>
+            <a:t>Use a CNN to classify the skin cancer type</a:t>
+          </a:r>
+        </a:p>
+        <a:p>
+          <a:pPr>
+            <a:buNone/>
+          </a:pPr>
+          <a:r>
+            <a:rPr lang="en-US" b="1" dirty="0"/>
+            <a:t>Item 6 </a:t>
+          </a:r>
+          <a:r>
+            <a:rPr lang="en-US" b="0" dirty="0"/>
+            <a:t>Establish a repeatable pipeline for training and exporting the ML model.</a:t>
+          </a:r>
+        </a:p>
+        <a:p>
+          <a:pPr>
+            <a:buNone/>
+          </a:pPr>
+          <a:r>
+            <a:rPr lang="en-US" b="1" dirty="0"/>
+            <a:t>Item 7 </a:t>
+          </a:r>
+          <a:r>
+            <a:rPr lang="en-US" b="0" dirty="0"/>
+            <a:t>Test the ML model for accuracy and reliability.</a:t>
           </a:r>
         </a:p>
       </dgm:t>
@@ -3154,17 +3241,17 @@
       </dgm:t>
     </dgm:pt>
     <dgm:pt modelId="{4F162181-7D82-4C24-A4CF-9EF1D92E5A8D}">
-      <dgm:prSet/>
+      <dgm:prSet custT="1"/>
       <dgm:spPr/>
       <dgm:t>
         <a:bodyPr/>
         <a:lstStyle/>
         <a:p>
           <a:r>
-            <a:rPr lang="en-US" b="1"/>
+            <a:rPr lang="en-US" sz="1800" b="1" dirty="0"/>
             <a:t>Sprint 3:</a:t>
           </a:r>
-          <a:endParaRPr lang="en-US"/>
+          <a:endParaRPr lang="en-US" sz="1800" dirty="0"/>
         </a:p>
       </dgm:t>
     </dgm:pt>
@@ -3198,9 +3285,14 @@
         <a:lstStyle/>
         <a:p>
           <a:r>
-            <a:rPr lang="en-US"/>
-            <a:t>Item 1 TBD</a:t>
+            <a:rPr lang="en-US" b="1" dirty="0"/>
+            <a:t>Item 1 </a:t>
           </a:r>
+          <a:r>
+            <a:rPr lang="en-US" b="0" dirty="0"/>
+            <a:t>Backend API/event processor initialized and pingable</a:t>
+          </a:r>
+          <a:endParaRPr lang="en-US" b="1" dirty="0"/>
         </a:p>
       </dgm:t>
     </dgm:pt>
@@ -3234,8 +3326,12 @@
         <a:lstStyle/>
         <a:p>
           <a:r>
-            <a:rPr lang="en-US"/>
-            <a:t>Item 2 TBD</a:t>
+            <a:rPr lang="en-US" b="1" dirty="0"/>
+            <a:t>Item 2</a:t>
+          </a:r>
+          <a:r>
+            <a:rPr lang="en-US" b="0" dirty="0"/>
+            <a:t> Establish a preprocessing tool to format the user-loaded image for the ML model</a:t>
           </a:r>
         </a:p>
       </dgm:t>
@@ -3270,8 +3366,53 @@
         <a:lstStyle/>
         <a:p>
           <a:r>
-            <a:rPr lang="en-US"/>
-            <a:t>Item 3 TBD</a:t>
+            <a:rPr lang="en-US" b="1" dirty="0"/>
+            <a:t>Item 3 </a:t>
+          </a:r>
+          <a:r>
+            <a:rPr lang="en-US" b="0" dirty="0"/>
+            <a:t>Backend responds to image event call by preprocessing the image</a:t>
+          </a:r>
+        </a:p>
+        <a:p>
+          <a:r>
+            <a:rPr lang="en-US" b="1" dirty="0"/>
+            <a:t>Item 4 </a:t>
+          </a:r>
+          <a:r>
+            <a:rPr lang="en-US" b="0" dirty="0"/>
+            <a:t>Backend executes the ML model with the preprocessed image</a:t>
+          </a:r>
+          <a:endParaRPr lang="en-US" b="1" dirty="0"/>
+        </a:p>
+        <a:p>
+          <a:r>
+            <a:rPr lang="en-US" b="1" dirty="0"/>
+            <a:t>Item 4</a:t>
+          </a:r>
+          <a:r>
+            <a:rPr lang="en-US" b="0" dirty="0"/>
+            <a:t> Responsive frontend renders with option to upload a photo</a:t>
+          </a:r>
+        </a:p>
+        <a:p>
+          <a:r>
+            <a:rPr lang="en-US" b="1" dirty="0"/>
+            <a:t>Item 5 </a:t>
+          </a:r>
+          <a:r>
+            <a:rPr lang="en-US" b="0" dirty="0"/>
+            <a:t>An image can be uploaded from the frontend</a:t>
+          </a:r>
+        </a:p>
+        <a:p>
+          <a:r>
+            <a:rPr lang="en-US" b="1" dirty="0"/>
+            <a:t>Item 6 </a:t>
+          </a:r>
+          <a:r>
+            <a:rPr lang="en-US" b="0" dirty="0"/>
+            <a:t>Frontend calls the backend API with the uploaded image</a:t>
           </a:r>
         </a:p>
       </dgm:t>
@@ -3299,17 +3440,17 @@
       </dgm:t>
     </dgm:pt>
     <dgm:pt modelId="{9CBCDC84-BF97-4BD7-8D1C-6181E76FF9F0}">
-      <dgm:prSet/>
+      <dgm:prSet custT="1"/>
       <dgm:spPr/>
       <dgm:t>
         <a:bodyPr/>
         <a:lstStyle/>
         <a:p>
           <a:r>
-            <a:rPr lang="en-US" b="1"/>
+            <a:rPr lang="en-US" sz="1800" b="1" dirty="0"/>
             <a:t>Sprint 4:</a:t>
           </a:r>
-          <a:endParaRPr lang="en-US"/>
+          <a:endParaRPr lang="en-US" sz="1800" dirty="0"/>
         </a:p>
       </dgm:t>
     </dgm:pt>
@@ -3343,8 +3484,26 @@
         <a:lstStyle/>
         <a:p>
           <a:r>
-            <a:rPr lang="en-US"/>
-            <a:t>Item 1 TBD</a:t>
+            <a:rPr lang="en-US" b="1" dirty="0"/>
+            <a:t>Item 1 </a:t>
+          </a:r>
+          <a:r>
+            <a:rPr lang="en-US" b="0" dirty="0"/>
+            <a:t>Backend returns simple result after ML model execution</a:t>
+          </a:r>
+          <a:r>
+            <a:rPr lang="en-US" b="1" dirty="0"/>
+            <a:t> </a:t>
+          </a:r>
+        </a:p>
+        <a:p>
+          <a:r>
+            <a:rPr lang="en-US" b="1" dirty="0"/>
+            <a:t>Item 2 </a:t>
+          </a:r>
+          <a:r>
+            <a:rPr lang="en-US" b="0" dirty="0"/>
+            <a:t>Validate the end-to-end workflow (image upload → analysis → results).</a:t>
           </a:r>
         </a:p>
       </dgm:t>
@@ -3379,8 +3538,12 @@
         <a:lstStyle/>
         <a:p>
           <a:r>
-            <a:rPr lang="en-US"/>
-            <a:t>Item 2 TBD</a:t>
+            <a:rPr lang="en-US" b="1" dirty="0"/>
+            <a:t>Item 3 </a:t>
+          </a:r>
+          <a:r>
+            <a:rPr lang="en-US" b="0" dirty="0"/>
+            <a:t>Backend content management for results information to be dynamically displayed with results</a:t>
           </a:r>
         </a:p>
       </dgm:t>
@@ -3415,9 +3578,24 @@
         <a:lstStyle/>
         <a:p>
           <a:r>
-            <a:rPr lang="en-US"/>
-            <a:t>Item 3 TBD</a:t>
+            <a:rPr lang="en-US" b="1" dirty="0"/>
+            <a:t>Item 4</a:t>
           </a:r>
+          <a:r>
+            <a:rPr lang="en-US" b="0" dirty="0"/>
+            <a:t> Backend serves content to the front end along with the results</a:t>
+          </a:r>
+        </a:p>
+        <a:p>
+          <a:r>
+            <a:rPr lang="en-US" b="1" dirty="0"/>
+            <a:t>Item 5 </a:t>
+          </a:r>
+          <a:r>
+            <a:rPr lang="en-US" b="0" dirty="0"/>
+            <a:t>Front end responds dynamically to content with information</a:t>
+          </a:r>
+          <a:endParaRPr lang="en-US" b="1" dirty="0"/>
         </a:p>
       </dgm:t>
     </dgm:pt>
@@ -3458,11 +3636,11 @@
       <dgm:spPr/>
     </dgm:pt>
     <dgm:pt modelId="{FF5DFABE-42E2-0847-86EF-7CDB5F1002F6}" type="pres">
-      <dgm:prSet presAssocID="{9CBCDC84-BF97-4BD7-8D1C-6181E76FF9F0}" presName="parentTextBox" presStyleLbl="alignNode1" presStyleIdx="0" presStyleCnt="3"/>
+      <dgm:prSet presAssocID="{9CBCDC84-BF97-4BD7-8D1C-6181E76FF9F0}" presName="parentTextBox" presStyleLbl="alignNode1" presStyleIdx="0" presStyleCnt="3" custScaleY="135052"/>
       <dgm:spPr/>
     </dgm:pt>
     <dgm:pt modelId="{B658C8BD-DCA0-6C46-9A52-D700D7AD1A25}" type="pres">
-      <dgm:prSet presAssocID="{9CBCDC84-BF97-4BD7-8D1C-6181E76FF9F0}" presName="descendantBox" presStyleLbl="bgAccFollowNode1" presStyleIdx="0" presStyleCnt="3"/>
+      <dgm:prSet presAssocID="{9CBCDC84-BF97-4BD7-8D1C-6181E76FF9F0}" presName="descendantBox" presStyleLbl="bgAccFollowNode1" presStyleIdx="0" presStyleCnt="3" custScaleY="139599"/>
       <dgm:spPr/>
     </dgm:pt>
     <dgm:pt modelId="{6595E1C0-C043-7442-9B40-92FEAC86487D}" type="pres">
@@ -3478,11 +3656,11 @@
       <dgm:spPr/>
     </dgm:pt>
     <dgm:pt modelId="{C4B45F58-9D45-4945-80ED-7F83014174CC}" type="pres">
-      <dgm:prSet presAssocID="{4F162181-7D82-4C24-A4CF-9EF1D92E5A8D}" presName="arrow" presStyleLbl="alignNode1" presStyleIdx="1" presStyleCnt="3"/>
+      <dgm:prSet presAssocID="{4F162181-7D82-4C24-A4CF-9EF1D92E5A8D}" presName="arrow" presStyleLbl="alignNode1" presStyleIdx="1" presStyleCnt="3" custScaleY="137484"/>
       <dgm:spPr/>
     </dgm:pt>
     <dgm:pt modelId="{3BEE0999-FA5F-B644-858A-E7D7CC533D11}" type="pres">
-      <dgm:prSet presAssocID="{4F162181-7D82-4C24-A4CF-9EF1D92E5A8D}" presName="descendantArrow" presStyleLbl="bgAccFollowNode1" presStyleIdx="1" presStyleCnt="3"/>
+      <dgm:prSet presAssocID="{4F162181-7D82-4C24-A4CF-9EF1D92E5A8D}" presName="descendantArrow" presStyleLbl="bgAccFollowNode1" presStyleIdx="1" presStyleCnt="3" custScaleY="156823"/>
       <dgm:spPr/>
     </dgm:pt>
     <dgm:pt modelId="{FF9C0AF9-CADC-ED46-8533-EACE9D8F70AA}" type="pres">
@@ -3498,11 +3676,11 @@
       <dgm:spPr/>
     </dgm:pt>
     <dgm:pt modelId="{EC82E5FF-5B23-3E44-AAEF-D20DB3E0BCC4}" type="pres">
-      <dgm:prSet presAssocID="{71EE360D-1390-41E2-91DE-B360117B76EF}" presName="arrow" presStyleLbl="alignNode1" presStyleIdx="2" presStyleCnt="3"/>
+      <dgm:prSet presAssocID="{71EE360D-1390-41E2-91DE-B360117B76EF}" presName="arrow" presStyleLbl="alignNode1" presStyleIdx="2" presStyleCnt="3" custScaleY="143856"/>
       <dgm:spPr/>
     </dgm:pt>
     <dgm:pt modelId="{A1C3C12C-0B10-C644-828C-59F92E65C5BF}" type="pres">
-      <dgm:prSet presAssocID="{71EE360D-1390-41E2-91DE-B360117B76EF}" presName="descendantArrow" presStyleLbl="bgAccFollowNode1" presStyleIdx="2" presStyleCnt="3"/>
+      <dgm:prSet presAssocID="{71EE360D-1390-41E2-91DE-B360117B76EF}" presName="descendantArrow" presStyleLbl="bgAccFollowNode1" presStyleIdx="2" presStyleCnt="3" custScaleY="172328"/>
       <dgm:spPr/>
     </dgm:pt>
   </dgm:ptLst>
@@ -3690,9 +3868,14 @@
         <a:lstStyle/>
         <a:p>
           <a:r>
-            <a:rPr lang="en-US"/>
-            <a:t>Node.js / JavaScript / ASP.NET Core</a:t>
+            <a:rPr lang="en-US" dirty="0"/>
+            <a:t>Node.js / JavaScript / ASP.NET Core or </a:t>
           </a:r>
+          <a:r>
+            <a:rPr lang="en-US" dirty="0" err="1"/>
+            <a:t>Express.js</a:t>
+          </a:r>
+          <a:endParaRPr lang="en-US" dirty="0"/>
         </a:p>
       </dgm:t>
     </dgm:pt>
@@ -3836,7 +4019,7 @@
         <a:lstStyle/>
         <a:p>
           <a:r>
-            <a:rPr lang="en-US"/>
+            <a:rPr lang="en-US" dirty="0"/>
             <a:t>OpenCV / PIL</a:t>
           </a:r>
         </a:p>
@@ -3909,7 +4092,7 @@
         <a:lstStyle/>
         <a:p>
           <a:r>
-            <a:rPr lang="en-US"/>
+            <a:rPr lang="en-US" dirty="0"/>
             <a:t>GitHub Actions / Docker / Azure</a:t>
           </a:r>
         </a:p>
@@ -4318,8 +4501,8 @@
       </dsp:nvSpPr>
       <dsp:spPr>
         <a:xfrm>
-          <a:off x="2006640" y="257"/>
-          <a:ext cx="8026560" cy="1420023"/>
+          <a:off x="2334577" y="503"/>
+          <a:ext cx="9338309" cy="1656228"/>
         </a:xfrm>
         <a:prstGeom prst="rect">
           <a:avLst/>
@@ -4362,12 +4545,12 @@
         <a:fontRef idx="minor"/>
       </dsp:style>
       <dsp:txBody>
-        <a:bodyPr spcFirstLastPara="0" vert="horz" wrap="square" lIns="155738" tIns="360686" rIns="155738" bIns="360686" numCol="1" spcCol="1270" anchor="ctr" anchorCtr="0">
+        <a:bodyPr spcFirstLastPara="0" vert="horz" wrap="square" lIns="181189" tIns="420682" rIns="181189" bIns="420682" numCol="1" spcCol="1270" anchor="ctr" anchorCtr="0">
           <a:noAutofit/>
         </a:bodyPr>
         <a:lstStyle/>
         <a:p>
-          <a:pPr marL="0" lvl="0" indent="0" algn="l" defTabSz="488950">
+          <a:pPr marL="0" lvl="0" indent="0" algn="l" defTabSz="711200">
             <a:lnSpc>
               <a:spcPct val="90000"/>
             </a:lnSpc>
@@ -4380,13 +4563,17 @@
             <a:buNone/>
           </a:pPr>
           <a:r>
-            <a:rPr lang="en-US" sz="1100" b="0" i="1" kern="1200" baseline="0"/>
-            <a:t>Epic 1 TBD</a:t>
+            <a:rPr lang="en-US" sz="1600" b="1" i="0" kern="1200" baseline="0" dirty="0"/>
+            <a:t>Epic 1</a:t>
           </a:r>
-          <a:endParaRPr lang="en-US" sz="1100" kern="1200"/>
+          <a:r>
+            <a:rPr lang="en-US" sz="1600" b="0" i="0" kern="1200" baseline="0" dirty="0"/>
+            <a:t> I am a user who wishes to use an image to detect skin cancer so that I receive information about my condition</a:t>
+          </a:r>
+          <a:endParaRPr lang="en-US" sz="1600" i="0" kern="1200" dirty="0"/>
         </a:p>
         <a:p>
-          <a:pPr marL="0" lvl="0" indent="0" algn="l" defTabSz="488950">
+          <a:pPr marL="0" lvl="0" indent="0" algn="l" defTabSz="711200">
             <a:lnSpc>
               <a:spcPct val="90000"/>
             </a:lnSpc>
@@ -4399,15 +4586,19 @@
             <a:buNone/>
           </a:pPr>
           <a:r>
-            <a:rPr lang="en-US" sz="1100" b="0" i="1" kern="1200" baseline="0"/>
-            <a:t>Epic 2 TBD</a:t>
+            <a:rPr lang="en-US" sz="1600" b="1" i="0" kern="1200" baseline="0" dirty="0"/>
+            <a:t>Epic 2</a:t>
           </a:r>
-          <a:endParaRPr lang="en-US" sz="1100" kern="1200"/>
+          <a:r>
+            <a:rPr lang="en-US" sz="1600" b="0" i="0" kern="1200" baseline="0" dirty="0"/>
+            <a:t> TBD</a:t>
+          </a:r>
+          <a:endParaRPr lang="en-US" sz="1600" i="0" kern="1200" dirty="0"/>
         </a:p>
       </dsp:txBody>
       <dsp:txXfrm>
-        <a:off x="2006640" y="257"/>
-        <a:ext cx="8026560" cy="1420023"/>
+        <a:off x="2334577" y="503"/>
+        <a:ext cx="9338309" cy="1656228"/>
       </dsp:txXfrm>
     </dsp:sp>
     <dsp:sp modelId="{DC686A0F-46CB-304E-99EE-B875DC2E66B5}">
@@ -4417,8 +4608,8 @@
       </dsp:nvSpPr>
       <dsp:spPr>
         <a:xfrm>
-          <a:off x="0" y="257"/>
-          <a:ext cx="2006640" cy="1420023"/>
+          <a:off x="0" y="503"/>
+          <a:ext cx="2334577" cy="1656228"/>
         </a:xfrm>
         <a:prstGeom prst="rect">
           <a:avLst/>
@@ -4459,12 +4650,12 @@
         </a:fontRef>
       </dsp:style>
       <dsp:txBody>
-        <a:bodyPr spcFirstLastPara="0" vert="horz" wrap="square" lIns="106185" tIns="140267" rIns="106185" bIns="140267" numCol="1" spcCol="1270" anchor="ctr" anchorCtr="0">
+        <a:bodyPr spcFirstLastPara="0" vert="horz" wrap="square" lIns="123538" tIns="163599" rIns="123538" bIns="163599" numCol="1" spcCol="1270" anchor="ctr" anchorCtr="0">
           <a:noAutofit/>
         </a:bodyPr>
         <a:lstStyle/>
         <a:p>
-          <a:pPr marL="0" lvl="0" indent="0" algn="ctr" defTabSz="622300">
+          <a:pPr marL="0" lvl="0" indent="0" algn="ctr" defTabSz="1244600">
             <a:lnSpc>
               <a:spcPct val="90000"/>
             </a:lnSpc>
@@ -4477,14 +4668,14 @@
             <a:buNone/>
           </a:pPr>
           <a:r>
-            <a:rPr lang="en-US" sz="1400" kern="1200"/>
+            <a:rPr lang="en-US" sz="2800" kern="1200" dirty="0"/>
             <a:t>Epics:</a:t>
           </a:r>
         </a:p>
       </dsp:txBody>
       <dsp:txXfrm>
-        <a:off x="0" y="257"/>
-        <a:ext cx="2006640" cy="1420023"/>
+        <a:off x="0" y="503"/>
+        <a:ext cx="2334577" cy="1656228"/>
       </dsp:txXfrm>
     </dsp:sp>
     <dsp:sp modelId="{B81F0CC9-04FE-B346-AAE8-3334BD1A1448}">
@@ -4494,8 +4685,8 @@
       </dsp:nvSpPr>
       <dsp:spPr>
         <a:xfrm>
-          <a:off x="2006640" y="1505481"/>
-          <a:ext cx="8026560" cy="1420023"/>
+          <a:off x="2332297" y="1756105"/>
+          <a:ext cx="9329190" cy="3321168"/>
         </a:xfrm>
         <a:prstGeom prst="rect">
           <a:avLst/>
@@ -4538,12 +4729,12 @@
         <a:fontRef idx="minor"/>
       </dsp:style>
       <dsp:txBody>
-        <a:bodyPr spcFirstLastPara="0" vert="horz" wrap="square" lIns="155738" tIns="360686" rIns="155738" bIns="360686" numCol="1" spcCol="1270" anchor="ctr" anchorCtr="0">
+        <a:bodyPr spcFirstLastPara="0" vert="horz" wrap="square" lIns="181012" tIns="420682" rIns="181012" bIns="420682" numCol="1" spcCol="1270" anchor="ctr" anchorCtr="0">
           <a:noAutofit/>
         </a:bodyPr>
         <a:lstStyle/>
         <a:p>
-          <a:pPr marL="0" lvl="0" indent="0" algn="l" defTabSz="488950">
+          <a:pPr marL="0" lvl="0" indent="0" algn="l" defTabSz="711200">
             <a:lnSpc>
               <a:spcPct val="90000"/>
             </a:lnSpc>
@@ -4556,13 +4747,17 @@
             <a:buNone/>
           </a:pPr>
           <a:r>
-            <a:rPr lang="en-US" sz="1100" b="0" i="1" kern="1200" baseline="0" dirty="0"/>
-            <a:t>Story 1 TBD</a:t>
+            <a:rPr lang="en-US" sz="1600" b="1" i="0" kern="1200" baseline="0" dirty="0"/>
+            <a:t>Story 1 </a:t>
           </a:r>
-          <a:endParaRPr lang="en-US" sz="1100" i="1" kern="1200" dirty="0"/>
+          <a:r>
+            <a:rPr lang="en-US" sz="1600" b="0" i="0" kern="1200" baseline="0" dirty="0"/>
+            <a:t>As a developer, I need a sequence to preprocess images (resize, normalize), so they are formatted correctly for the ML model</a:t>
+          </a:r>
+          <a:endParaRPr lang="en-US" sz="1600" i="0" kern="1200" dirty="0"/>
         </a:p>
         <a:p>
-          <a:pPr marL="0" lvl="0" indent="0" algn="l" defTabSz="488950">
+          <a:pPr marL="0" lvl="0" indent="0" algn="l" defTabSz="711200">
             <a:lnSpc>
               <a:spcPct val="90000"/>
             </a:lnSpc>
@@ -4575,13 +4770,17 @@
             <a:buNone/>
           </a:pPr>
           <a:r>
-            <a:rPr lang="en-US" sz="1100" b="0" i="1" kern="1200" baseline="0" dirty="0"/>
-            <a:t>Story 2 TBD	</a:t>
+            <a:rPr lang="en-US" sz="1600" b="1" i="0" kern="1200" baseline="0" dirty="0"/>
+            <a:t>Story 2 </a:t>
           </a:r>
-          <a:endParaRPr lang="en-US" sz="1100" i="1" kern="1200" dirty="0"/>
+          <a:r>
+            <a:rPr lang="en-US" sz="1600" b="0" i="0" kern="1200" baseline="0" dirty="0"/>
+            <a:t>As a backend developer, I need to provide backend calls that execute the ML model, so that the frontend can make the proper calls to the backend. 	</a:t>
+          </a:r>
+          <a:endParaRPr lang="en-US" sz="1600" i="0" kern="1200" dirty="0"/>
         </a:p>
         <a:p>
-          <a:pPr marL="0" lvl="0" indent="0" algn="l" defTabSz="488950">
+          <a:pPr marL="0" lvl="0" indent="0" algn="l" defTabSz="711200">
             <a:lnSpc>
               <a:spcPct val="90000"/>
             </a:lnSpc>
@@ -4594,13 +4793,17 @@
             <a:buNone/>
           </a:pPr>
           <a:r>
-            <a:rPr lang="en-US" sz="1100" b="0" i="1" kern="1200" baseline="0" dirty="0"/>
-            <a:t>Story 3 TBD</a:t>
+            <a:rPr lang="en-US" sz="1600" b="1" i="0" kern="1200" baseline="0" dirty="0"/>
+            <a:t>Story 3 </a:t>
           </a:r>
-          <a:endParaRPr lang="en-US" sz="1100" i="1" kern="1200" dirty="0"/>
+          <a:r>
+            <a:rPr lang="en-US" sz="1600" b="0" i="0" kern="1200" baseline="0" dirty="0"/>
+            <a:t>As a user, I want to upload a clear image of the affected skin area so that I can receive an instant diagnosis.</a:t>
+          </a:r>
+          <a:endParaRPr lang="en-US" sz="1600" b="0" i="0" kern="1200" dirty="0"/>
         </a:p>
         <a:p>
-          <a:pPr marL="0" lvl="0" indent="0" algn="l" defTabSz="488950">
+          <a:pPr marL="0" lvl="0" indent="0" algn="l" defTabSz="711200">
             <a:lnSpc>
               <a:spcPct val="90000"/>
             </a:lnSpc>
@@ -4613,12 +4816,16 @@
             <a:buNone/>
           </a:pPr>
           <a:r>
-            <a:rPr lang="en-US" sz="1100" b="0" i="1" kern="1200" baseline="0" dirty="0"/>
-            <a:t>Story 4 TBD</a:t>
+            <a:rPr lang="en-US" sz="1600" b="1" i="0" kern="1200" baseline="0" dirty="0"/>
+            <a:t>Story 4</a:t>
+          </a:r>
+          <a:r>
+            <a:rPr lang="en-US" sz="1600" b="0" i="0" kern="1200" baseline="0" dirty="0"/>
+            <a:t> As a user, I want to download the analysis results, so I can share them with my health team</a:t>
           </a:r>
         </a:p>
         <a:p>
-          <a:pPr marL="0" lvl="0" indent="0" algn="l" defTabSz="488950">
+          <a:pPr marL="0" lvl="0" indent="0" algn="l" defTabSz="711200">
             <a:lnSpc>
               <a:spcPct val="90000"/>
             </a:lnSpc>
@@ -4631,14 +4838,18 @@
             <a:buNone/>
           </a:pPr>
           <a:r>
-            <a:rPr lang="en-US" sz="1100" i="1" kern="1200" dirty="0"/>
-            <a:t>Story 5 TBD </a:t>
+            <a:rPr lang="en-US" sz="1600" b="1" i="0" kern="1200" dirty="0"/>
+            <a:t>Story 5 </a:t>
+          </a:r>
+          <a:r>
+            <a:rPr lang="en-US" sz="1600" b="0" i="0" kern="1200" dirty="0"/>
+            <a:t>As a user, I want to view or download the analysis results, so I can share them with my health team</a:t>
           </a:r>
         </a:p>
       </dsp:txBody>
       <dsp:txXfrm>
-        <a:off x="2006640" y="1505481"/>
-        <a:ext cx="8026560" cy="1420023"/>
+        <a:off x="2332297" y="1756105"/>
+        <a:ext cx="9329190" cy="3321168"/>
       </dsp:txXfrm>
     </dsp:sp>
     <dsp:sp modelId="{32692678-0BF9-CA44-8122-045FA0B2AEC7}">
@@ -4648,8 +4859,8 @@
       </dsp:nvSpPr>
       <dsp:spPr>
         <a:xfrm>
-          <a:off x="0" y="1505481"/>
-          <a:ext cx="2006640" cy="1420023"/>
+          <a:off x="0" y="1774166"/>
+          <a:ext cx="2332297" cy="3285046"/>
         </a:xfrm>
         <a:prstGeom prst="rect">
           <a:avLst/>
@@ -4690,12 +4901,12 @@
         </a:fontRef>
       </dsp:style>
       <dsp:txBody>
-        <a:bodyPr spcFirstLastPara="0" vert="horz" wrap="square" lIns="106185" tIns="140267" rIns="106185" bIns="140267" numCol="1" spcCol="1270" anchor="ctr" anchorCtr="0">
+        <a:bodyPr spcFirstLastPara="0" vert="horz" wrap="square" lIns="123417" tIns="163599" rIns="123417" bIns="163599" numCol="1" spcCol="1270" anchor="ctr" anchorCtr="0">
           <a:noAutofit/>
         </a:bodyPr>
         <a:lstStyle/>
         <a:p>
-          <a:pPr marL="0" lvl="0" indent="0" algn="ctr" defTabSz="622300">
+          <a:pPr marL="0" lvl="0" indent="0" algn="ctr" defTabSz="1244600">
             <a:lnSpc>
               <a:spcPct val="90000"/>
             </a:lnSpc>
@@ -4708,14 +4919,14 @@
             <a:buNone/>
           </a:pPr>
           <a:r>
-            <a:rPr lang="en-US" sz="1400" kern="1200"/>
+            <a:rPr lang="en-US" sz="2800" kern="1200" dirty="0"/>
             <a:t>Stories:</a:t>
           </a:r>
         </a:p>
       </dsp:txBody>
       <dsp:txXfrm>
-        <a:off x="0" y="1505481"/>
-        <a:ext cx="2006640" cy="1420023"/>
+        <a:off x="0" y="1774166"/>
+        <a:ext cx="2332297" cy="3285046"/>
       </dsp:txXfrm>
     </dsp:sp>
   </dsp:spTree>
@@ -4737,8 +4948,8 @@
       </dsp:nvSpPr>
       <dsp:spPr>
         <a:xfrm>
-          <a:off x="0" y="3897595"/>
-          <a:ext cx="2857500" cy="1279277"/>
+          <a:off x="0" y="4232876"/>
+          <a:ext cx="2857500" cy="1315451"/>
         </a:xfrm>
         <a:prstGeom prst="rect">
           <a:avLst/>
@@ -4779,12 +4990,12 @@
         </a:fontRef>
       </dsp:style>
       <dsp:txBody>
-        <a:bodyPr spcFirstLastPara="0" vert="horz" wrap="square" lIns="203225" tIns="256032" rIns="203225" bIns="256032" numCol="1" spcCol="1270" anchor="ctr" anchorCtr="0">
+        <a:bodyPr spcFirstLastPara="0" vert="horz" wrap="square" lIns="203225" tIns="128016" rIns="203225" bIns="128016" numCol="1" spcCol="1270" anchor="ctr" anchorCtr="0">
           <a:noAutofit/>
         </a:bodyPr>
         <a:lstStyle/>
         <a:p>
-          <a:pPr marL="0" lvl="0" indent="0" algn="ctr" defTabSz="1600200">
+          <a:pPr marL="0" lvl="0" indent="0" algn="ctr" defTabSz="800100">
             <a:lnSpc>
               <a:spcPct val="90000"/>
             </a:lnSpc>
@@ -4797,15 +5008,15 @@
             <a:buNone/>
           </a:pPr>
           <a:r>
-            <a:rPr lang="en-US" sz="3600" b="1" kern="1200"/>
+            <a:rPr lang="en-US" sz="1800" b="1" kern="1200" dirty="0"/>
             <a:t>Sprint 4:</a:t>
           </a:r>
-          <a:endParaRPr lang="en-US" sz="3600" kern="1200"/>
+          <a:endParaRPr lang="en-US" sz="1800" kern="1200" dirty="0"/>
         </a:p>
       </dsp:txBody>
       <dsp:txXfrm>
-        <a:off x="0" y="3897595"/>
-        <a:ext cx="2857500" cy="1279277"/>
+        <a:off x="0" y="4232876"/>
+        <a:ext cx="2857500" cy="1315451"/>
       </dsp:txXfrm>
     </dsp:sp>
     <dsp:sp modelId="{B658C8BD-DCA0-6C46-9A52-D700D7AD1A25}">
@@ -4815,8 +5026,8 @@
       </dsp:nvSpPr>
       <dsp:spPr>
         <a:xfrm>
-          <a:off x="2857500" y="3897595"/>
-          <a:ext cx="8572500" cy="1279277"/>
+          <a:off x="2857500" y="4210731"/>
+          <a:ext cx="8572500" cy="1359741"/>
         </a:xfrm>
         <a:prstGeom prst="rect">
           <a:avLst/>
@@ -4859,12 +5070,12 @@
         <a:fontRef idx="minor"/>
       </dsp:style>
       <dsp:txBody>
-        <a:bodyPr spcFirstLastPara="0" vert="horz" wrap="square" lIns="173891" tIns="165100" rIns="173891" bIns="165100" numCol="1" spcCol="1270" anchor="ctr" anchorCtr="0">
+        <a:bodyPr spcFirstLastPara="0" vert="horz" wrap="square" lIns="173891" tIns="139700" rIns="173891" bIns="139700" numCol="1" spcCol="1270" anchor="ctr" anchorCtr="0">
           <a:noAutofit/>
         </a:bodyPr>
         <a:lstStyle/>
         <a:p>
-          <a:pPr marL="0" lvl="0" indent="0" algn="l" defTabSz="577850">
+          <a:pPr marL="0" lvl="0" indent="0" algn="l" defTabSz="488950">
             <a:lnSpc>
               <a:spcPct val="90000"/>
             </a:lnSpc>
@@ -4877,12 +5088,20 @@
             <a:buNone/>
           </a:pPr>
           <a:r>
-            <a:rPr lang="en-US" sz="1300" kern="1200"/>
-            <a:t>Item 1 TBD</a:t>
+            <a:rPr lang="en-US" sz="1100" b="1" kern="1200" dirty="0"/>
+            <a:t>Item 1 </a:t>
+          </a:r>
+          <a:r>
+            <a:rPr lang="en-US" sz="1100" b="0" kern="1200" dirty="0"/>
+            <a:t>Backend returns simple result after ML model execution</a:t>
+          </a:r>
+          <a:r>
+            <a:rPr lang="en-US" sz="1100" b="1" kern="1200" dirty="0"/>
+            <a:t> </a:t>
           </a:r>
         </a:p>
         <a:p>
-          <a:pPr marL="0" lvl="0" indent="0" algn="l" defTabSz="577850">
+          <a:pPr marL="0" lvl="0" indent="0" algn="l" defTabSz="488950">
             <a:lnSpc>
               <a:spcPct val="90000"/>
             </a:lnSpc>
@@ -4895,12 +5114,16 @@
             <a:buNone/>
           </a:pPr>
           <a:r>
-            <a:rPr lang="en-US" sz="1300" kern="1200"/>
-            <a:t>Item 2 TBD</a:t>
+            <a:rPr lang="en-US" sz="1100" b="1" kern="1200" dirty="0"/>
+            <a:t>Item 2 </a:t>
+          </a:r>
+          <a:r>
+            <a:rPr lang="en-US" sz="1100" b="0" kern="1200" dirty="0"/>
+            <a:t>Validate the end-to-end workflow (image upload → analysis → results).</a:t>
           </a:r>
         </a:p>
         <a:p>
-          <a:pPr marL="0" lvl="0" indent="0" algn="l" defTabSz="577850">
+          <a:pPr marL="0" lvl="0" indent="0" algn="l" defTabSz="488950">
             <a:lnSpc>
               <a:spcPct val="90000"/>
             </a:lnSpc>
@@ -4913,14 +5136,63 @@
             <a:buNone/>
           </a:pPr>
           <a:r>
-            <a:rPr lang="en-US" sz="1300" kern="1200"/>
-            <a:t>Item 3 TBD</a:t>
+            <a:rPr lang="en-US" sz="1100" b="1" kern="1200" dirty="0"/>
+            <a:t>Item 3 </a:t>
           </a:r>
+          <a:r>
+            <a:rPr lang="en-US" sz="1100" b="0" kern="1200" dirty="0"/>
+            <a:t>Backend content management for results information to be dynamically displayed with results</a:t>
+          </a:r>
+        </a:p>
+        <a:p>
+          <a:pPr marL="0" lvl="0" indent="0" algn="l" defTabSz="488950">
+            <a:lnSpc>
+              <a:spcPct val="90000"/>
+            </a:lnSpc>
+            <a:spcBef>
+              <a:spcPct val="0"/>
+            </a:spcBef>
+            <a:spcAft>
+              <a:spcPct val="35000"/>
+            </a:spcAft>
+            <a:buNone/>
+          </a:pPr>
+          <a:r>
+            <a:rPr lang="en-US" sz="1100" b="1" kern="1200" dirty="0"/>
+            <a:t>Item 4</a:t>
+          </a:r>
+          <a:r>
+            <a:rPr lang="en-US" sz="1100" b="0" kern="1200" dirty="0"/>
+            <a:t> Backend serves content to the front end along with the results</a:t>
+          </a:r>
+        </a:p>
+        <a:p>
+          <a:pPr marL="0" lvl="0" indent="0" algn="l" defTabSz="488950">
+            <a:lnSpc>
+              <a:spcPct val="90000"/>
+            </a:lnSpc>
+            <a:spcBef>
+              <a:spcPct val="0"/>
+            </a:spcBef>
+            <a:spcAft>
+              <a:spcPct val="35000"/>
+            </a:spcAft>
+            <a:buNone/>
+          </a:pPr>
+          <a:r>
+            <a:rPr lang="en-US" sz="1100" b="1" kern="1200" dirty="0"/>
+            <a:t>Item 5 </a:t>
+          </a:r>
+          <a:r>
+            <a:rPr lang="en-US" sz="1100" b="0" kern="1200" dirty="0"/>
+            <a:t>Front end responds dynamically to content with information</a:t>
+          </a:r>
+          <a:endParaRPr lang="en-US" sz="1100" b="1" kern="1200" dirty="0"/>
         </a:p>
       </dsp:txBody>
       <dsp:txXfrm>
-        <a:off x="2857500" y="3897595"/>
-        <a:ext cx="8572500" cy="1279277"/>
+        <a:off x="2857500" y="4210731"/>
+        <a:ext cx="8572500" cy="1359741"/>
       </dsp:txXfrm>
     </dsp:sp>
     <dsp:sp modelId="{C4B45F58-9D45-4945-80ED-7F83014174CC}">
@@ -4930,8 +5202,8 @@
       </dsp:nvSpPr>
       <dsp:spPr>
         <a:xfrm rot="10800000">
-          <a:off x="0" y="1949255"/>
-          <a:ext cx="2857500" cy="1967529"/>
+          <a:off x="0" y="2165744"/>
+          <a:ext cx="2857500" cy="2059597"/>
         </a:xfrm>
         <a:prstGeom prst="upArrowCallout">
           <a:avLst>
@@ -4977,12 +5249,12 @@
         </a:fontRef>
       </dsp:style>
       <dsp:txBody>
-        <a:bodyPr spcFirstLastPara="0" vert="horz" wrap="square" lIns="203225" tIns="256032" rIns="203225" bIns="256032" numCol="1" spcCol="1270" anchor="ctr" anchorCtr="0">
+        <a:bodyPr spcFirstLastPara="0" vert="horz" wrap="square" lIns="203225" tIns="128016" rIns="203225" bIns="128016" numCol="1" spcCol="1270" anchor="ctr" anchorCtr="0">
           <a:noAutofit/>
         </a:bodyPr>
         <a:lstStyle/>
         <a:p>
-          <a:pPr marL="0" lvl="0" indent="0" algn="ctr" defTabSz="1600200">
+          <a:pPr marL="0" lvl="0" indent="0" algn="ctr" defTabSz="800100">
             <a:lnSpc>
               <a:spcPct val="90000"/>
             </a:lnSpc>
@@ -4995,15 +5267,15 @@
             <a:buNone/>
           </a:pPr>
           <a:r>
-            <a:rPr lang="en-US" sz="3600" b="1" kern="1200"/>
+            <a:rPr lang="en-US" sz="1800" b="1" kern="1200" dirty="0"/>
             <a:t>Sprint 3:</a:t>
           </a:r>
-          <a:endParaRPr lang="en-US" sz="3600" kern="1200"/>
+          <a:endParaRPr lang="en-US" sz="1800" kern="1200" dirty="0"/>
         </a:p>
       </dsp:txBody>
       <dsp:txXfrm rot="-10800000">
-        <a:off x="0" y="1949255"/>
-        <a:ext cx="2857500" cy="1278893"/>
+        <a:off x="0" y="2165744"/>
+        <a:ext cx="2857500" cy="1338738"/>
       </dsp:txXfrm>
     </dsp:sp>
     <dsp:sp modelId="{3BEE0999-FA5F-B644-858A-E7D7CC533D11}">
@@ -5013,8 +5285,8 @@
       </dsp:nvSpPr>
       <dsp:spPr>
         <a:xfrm>
-          <a:off x="2857500" y="1949255"/>
-          <a:ext cx="8572500" cy="1278893"/>
+          <a:off x="2857500" y="2169857"/>
+          <a:ext cx="8572500" cy="1527050"/>
         </a:xfrm>
         <a:prstGeom prst="rect">
           <a:avLst/>
@@ -5057,12 +5329,12 @@
         <a:fontRef idx="minor"/>
       </dsp:style>
       <dsp:txBody>
-        <a:bodyPr spcFirstLastPara="0" vert="horz" wrap="square" lIns="173891" tIns="165100" rIns="173891" bIns="165100" numCol="1" spcCol="1270" anchor="ctr" anchorCtr="0">
+        <a:bodyPr spcFirstLastPara="0" vert="horz" wrap="square" lIns="173891" tIns="139700" rIns="173891" bIns="139700" numCol="1" spcCol="1270" anchor="ctr" anchorCtr="0">
           <a:noAutofit/>
         </a:bodyPr>
         <a:lstStyle/>
         <a:p>
-          <a:pPr marL="0" lvl="0" indent="0" algn="l" defTabSz="577850">
+          <a:pPr marL="0" lvl="0" indent="0" algn="l" defTabSz="488950">
             <a:lnSpc>
               <a:spcPct val="90000"/>
             </a:lnSpc>
@@ -5075,12 +5347,17 @@
             <a:buNone/>
           </a:pPr>
           <a:r>
-            <a:rPr lang="en-US" sz="1300" kern="1200"/>
-            <a:t>Item 1 TBD</a:t>
+            <a:rPr lang="en-US" sz="1100" b="1" kern="1200" dirty="0"/>
+            <a:t>Item 1 </a:t>
           </a:r>
+          <a:r>
+            <a:rPr lang="en-US" sz="1100" b="0" kern="1200" dirty="0"/>
+            <a:t>Backend API/event processor initialized and pingable</a:t>
+          </a:r>
+          <a:endParaRPr lang="en-US" sz="1100" b="1" kern="1200" dirty="0"/>
         </a:p>
         <a:p>
-          <a:pPr marL="0" lvl="0" indent="0" algn="l" defTabSz="577850">
+          <a:pPr marL="0" lvl="0" indent="0" algn="l" defTabSz="488950">
             <a:lnSpc>
               <a:spcPct val="90000"/>
             </a:lnSpc>
@@ -5093,12 +5370,16 @@
             <a:buNone/>
           </a:pPr>
           <a:r>
-            <a:rPr lang="en-US" sz="1300" kern="1200"/>
-            <a:t>Item 2 TBD</a:t>
+            <a:rPr lang="en-US" sz="1100" b="1" kern="1200" dirty="0"/>
+            <a:t>Item 2</a:t>
+          </a:r>
+          <a:r>
+            <a:rPr lang="en-US" sz="1100" b="0" kern="1200" dirty="0"/>
+            <a:t> Establish a preprocessing tool to format the user-loaded image for the ML model</a:t>
           </a:r>
         </a:p>
         <a:p>
-          <a:pPr marL="0" lvl="0" indent="0" algn="l" defTabSz="577850">
+          <a:pPr marL="0" lvl="0" indent="0" algn="l" defTabSz="488950">
             <a:lnSpc>
               <a:spcPct val="90000"/>
             </a:lnSpc>
@@ -5111,14 +5392,107 @@
             <a:buNone/>
           </a:pPr>
           <a:r>
-            <a:rPr lang="en-US" sz="1300" kern="1200"/>
-            <a:t>Item 3 TBD</a:t>
+            <a:rPr lang="en-US" sz="1100" b="1" kern="1200" dirty="0"/>
+            <a:t>Item 3 </a:t>
+          </a:r>
+          <a:r>
+            <a:rPr lang="en-US" sz="1100" b="0" kern="1200" dirty="0"/>
+            <a:t>Backend responds to image event call by preprocessing the image</a:t>
+          </a:r>
+        </a:p>
+        <a:p>
+          <a:pPr marL="0" lvl="0" indent="0" algn="l" defTabSz="488950">
+            <a:lnSpc>
+              <a:spcPct val="90000"/>
+            </a:lnSpc>
+            <a:spcBef>
+              <a:spcPct val="0"/>
+            </a:spcBef>
+            <a:spcAft>
+              <a:spcPct val="35000"/>
+            </a:spcAft>
+            <a:buNone/>
+          </a:pPr>
+          <a:r>
+            <a:rPr lang="en-US" sz="1100" b="1" kern="1200" dirty="0"/>
+            <a:t>Item 4 </a:t>
+          </a:r>
+          <a:r>
+            <a:rPr lang="en-US" sz="1100" b="0" kern="1200" dirty="0"/>
+            <a:t>Backend executes the ML model with the preprocessed image</a:t>
+          </a:r>
+          <a:endParaRPr lang="en-US" sz="1100" b="1" kern="1200" dirty="0"/>
+        </a:p>
+        <a:p>
+          <a:pPr marL="0" lvl="0" indent="0" algn="l" defTabSz="488950">
+            <a:lnSpc>
+              <a:spcPct val="90000"/>
+            </a:lnSpc>
+            <a:spcBef>
+              <a:spcPct val="0"/>
+            </a:spcBef>
+            <a:spcAft>
+              <a:spcPct val="35000"/>
+            </a:spcAft>
+            <a:buNone/>
+          </a:pPr>
+          <a:r>
+            <a:rPr lang="en-US" sz="1100" b="1" kern="1200" dirty="0"/>
+            <a:t>Item 4</a:t>
+          </a:r>
+          <a:r>
+            <a:rPr lang="en-US" sz="1100" b="0" kern="1200" dirty="0"/>
+            <a:t> Responsive frontend renders with option to upload a photo</a:t>
+          </a:r>
+        </a:p>
+        <a:p>
+          <a:pPr marL="0" lvl="0" indent="0" algn="l" defTabSz="488950">
+            <a:lnSpc>
+              <a:spcPct val="90000"/>
+            </a:lnSpc>
+            <a:spcBef>
+              <a:spcPct val="0"/>
+            </a:spcBef>
+            <a:spcAft>
+              <a:spcPct val="35000"/>
+            </a:spcAft>
+            <a:buNone/>
+          </a:pPr>
+          <a:r>
+            <a:rPr lang="en-US" sz="1100" b="1" kern="1200" dirty="0"/>
+            <a:t>Item 5 </a:t>
+          </a:r>
+          <a:r>
+            <a:rPr lang="en-US" sz="1100" b="0" kern="1200" dirty="0"/>
+            <a:t>An image can be uploaded from the frontend</a:t>
+          </a:r>
+        </a:p>
+        <a:p>
+          <a:pPr marL="0" lvl="0" indent="0" algn="l" defTabSz="488950">
+            <a:lnSpc>
+              <a:spcPct val="90000"/>
+            </a:lnSpc>
+            <a:spcBef>
+              <a:spcPct val="0"/>
+            </a:spcBef>
+            <a:spcAft>
+              <a:spcPct val="35000"/>
+            </a:spcAft>
+            <a:buNone/>
+          </a:pPr>
+          <a:r>
+            <a:rPr lang="en-US" sz="1100" b="1" kern="1200" dirty="0"/>
+            <a:t>Item 6 </a:t>
+          </a:r>
+          <a:r>
+            <a:rPr lang="en-US" sz="1100" b="0" kern="1200" dirty="0"/>
+            <a:t>Frontend calls the backend API with the uploaded image</a:t>
           </a:r>
         </a:p>
       </dsp:txBody>
       <dsp:txXfrm>
-        <a:off x="2857500" y="1949255"/>
-        <a:ext cx="8572500" cy="1278893"/>
+        <a:off x="2857500" y="2169857"/>
+        <a:ext cx="8572500" cy="1527050"/>
       </dsp:txXfrm>
     </dsp:sp>
     <dsp:sp modelId="{EC82E5FF-5B23-3E44-AAEF-D20DB3E0BCC4}">
@@ -5128,8 +5502,8 @@
       </dsp:nvSpPr>
       <dsp:spPr>
         <a:xfrm rot="10800000">
-          <a:off x="0" y="915"/>
-          <a:ext cx="2857500" cy="1967529"/>
+          <a:off x="0" y="25300"/>
+          <a:ext cx="2857500" cy="2155054"/>
         </a:xfrm>
         <a:prstGeom prst="upArrowCallout">
           <a:avLst>
@@ -5175,12 +5549,12 @@
         </a:fontRef>
       </dsp:style>
       <dsp:txBody>
-        <a:bodyPr spcFirstLastPara="0" vert="horz" wrap="square" lIns="203225" tIns="256032" rIns="203225" bIns="256032" numCol="1" spcCol="1270" anchor="ctr" anchorCtr="0">
+        <a:bodyPr spcFirstLastPara="0" vert="horz" wrap="square" lIns="203225" tIns="128016" rIns="203225" bIns="128016" numCol="1" spcCol="1270" anchor="ctr" anchorCtr="0">
           <a:noAutofit/>
         </a:bodyPr>
         <a:lstStyle/>
         <a:p>
-          <a:pPr marL="0" lvl="0" indent="0" algn="ctr" defTabSz="1600200">
+          <a:pPr marL="0" lvl="0" indent="0" algn="ctr" defTabSz="800100">
             <a:lnSpc>
               <a:spcPct val="90000"/>
             </a:lnSpc>
@@ -5193,15 +5567,15 @@
             <a:buNone/>
           </a:pPr>
           <a:r>
-            <a:rPr lang="en-US" sz="3600" b="1" kern="1200" dirty="0"/>
+            <a:rPr lang="en-US" sz="1800" b="1" kern="1200" dirty="0"/>
             <a:t>Sprint 2:</a:t>
           </a:r>
-          <a:endParaRPr lang="en-US" sz="3600" kern="1200" dirty="0"/>
+          <a:endParaRPr lang="en-US" sz="1800" kern="1200" dirty="0"/>
         </a:p>
       </dsp:txBody>
       <dsp:txXfrm rot="-10800000">
-        <a:off x="0" y="915"/>
-        <a:ext cx="2857500" cy="1278893"/>
+        <a:off x="0" y="25300"/>
+        <a:ext cx="2857500" cy="1400785"/>
       </dsp:txXfrm>
     </dsp:sp>
     <dsp:sp modelId="{A1C3C12C-0B10-C644-828C-59F92E65C5BF}">
@@ -5211,8 +5585,8 @@
       </dsp:nvSpPr>
       <dsp:spPr>
         <a:xfrm>
-          <a:off x="2857500" y="915"/>
-          <a:ext cx="8572500" cy="1278893"/>
+          <a:off x="2857500" y="1652"/>
+          <a:ext cx="8572500" cy="1678029"/>
         </a:xfrm>
         <a:prstGeom prst="rect">
           <a:avLst/>
@@ -5255,12 +5629,12 @@
         <a:fontRef idx="minor"/>
       </dsp:style>
       <dsp:txBody>
-        <a:bodyPr spcFirstLastPara="0" vert="horz" wrap="square" lIns="173891" tIns="165100" rIns="173891" bIns="165100" numCol="1" spcCol="1270" anchor="ctr" anchorCtr="0">
+        <a:bodyPr spcFirstLastPara="0" vert="horz" wrap="square" lIns="173891" tIns="139700" rIns="173891" bIns="139700" numCol="1" spcCol="1270" anchor="ctr" anchorCtr="0">
           <a:noAutofit/>
         </a:bodyPr>
         <a:lstStyle/>
         <a:p>
-          <a:pPr marL="0" lvl="0" indent="0" algn="l" defTabSz="577850">
+          <a:pPr marL="0" lvl="0" indent="0" algn="l" defTabSz="488950">
             <a:lnSpc>
               <a:spcPct val="90000"/>
             </a:lnSpc>
@@ -5274,12 +5648,16 @@
             <a:buNone/>
           </a:pPr>
           <a:r>
-            <a:rPr lang="en-US" sz="1300" kern="1200" dirty="0"/>
-            <a:t>Item 1 TBD </a:t>
+            <a:rPr lang="en-US" sz="1100" b="1" kern="1200" dirty="0"/>
+            <a:t>Item 1</a:t>
+          </a:r>
+          <a:r>
+            <a:rPr lang="en-US" sz="1100" b="0" kern="1200" dirty="0"/>
+            <a:t> Determine the required input size for your ML model</a:t>
           </a:r>
         </a:p>
         <a:p>
-          <a:pPr marL="0" lvl="0" indent="0" algn="l" defTabSz="577850">
+          <a:pPr marL="0" lvl="0" indent="0" algn="l" defTabSz="488950">
             <a:lnSpc>
               <a:spcPct val="90000"/>
             </a:lnSpc>
@@ -5292,12 +5670,20 @@
             <a:buNone/>
           </a:pPr>
           <a:r>
-            <a:rPr lang="en-US" sz="1300" kern="1200" dirty="0"/>
-            <a:t>Item 2 TBD</a:t>
+            <a:rPr lang="en-US" sz="1100" b="1" kern="1200" dirty="0"/>
+            <a:t>Item 2 </a:t>
+          </a:r>
+          <a:r>
+            <a:rPr lang="en-US" sz="1100" b="0" kern="1200" dirty="0"/>
+            <a:t>Identify datasets from where we can fetch the images for training the ML model</a:t>
+          </a:r>
+          <a:r>
+            <a:rPr lang="en-US" sz="1100" kern="1200" dirty="0"/>
+            <a:t> </a:t>
           </a:r>
         </a:p>
         <a:p>
-          <a:pPr marL="0" lvl="0" indent="0" algn="l" defTabSz="577850">
+          <a:pPr marL="0" lvl="0" indent="0" algn="l" defTabSz="488950">
             <a:lnSpc>
               <a:spcPct val="90000"/>
             </a:lnSpc>
@@ -5310,12 +5696,16 @@
             <a:buNone/>
           </a:pPr>
           <a:r>
-            <a:rPr lang="en-US" sz="1300" kern="1200" dirty="0"/>
-            <a:t>Item 3 TBD</a:t>
+            <a:rPr lang="en-US" sz="1100" b="1" kern="1200" dirty="0"/>
+            <a:t>Item 3 </a:t>
+          </a:r>
+          <a:r>
+            <a:rPr lang="en-US" sz="1100" b="0" kern="1200" dirty="0"/>
+            <a:t>Convert images to the required color space</a:t>
           </a:r>
         </a:p>
         <a:p>
-          <a:pPr marL="0" lvl="0" indent="0" algn="l" defTabSz="577850">
+          <a:pPr marL="0" lvl="0" indent="0" algn="l" defTabSz="488950">
             <a:lnSpc>
               <a:spcPct val="90000"/>
             </a:lnSpc>
@@ -5328,14 +5718,84 @@
             <a:buNone/>
           </a:pPr>
           <a:r>
-            <a:rPr lang="en-US" sz="1300" kern="1200" dirty="0"/>
-            <a:t>Item 4 TBD</a:t>
+            <a:rPr lang="en-US" sz="1100" b="1" kern="1200" dirty="0"/>
+            <a:t>Item 4 </a:t>
+          </a:r>
+          <a:r>
+            <a:rPr lang="en-US" sz="1100" b="0" kern="1200" dirty="0"/>
+            <a:t>Implement an image augmentation pipeline to improve model generalization.</a:t>
+          </a:r>
+        </a:p>
+        <a:p>
+          <a:pPr marL="0" lvl="0" indent="0" algn="l" defTabSz="488950">
+            <a:lnSpc>
+              <a:spcPct val="90000"/>
+            </a:lnSpc>
+            <a:spcBef>
+              <a:spcPct val="0"/>
+            </a:spcBef>
+            <a:spcAft>
+              <a:spcPct val="35000"/>
+            </a:spcAft>
+            <a:buNone/>
+          </a:pPr>
+          <a:r>
+            <a:rPr lang="en-US" sz="1100" b="1" kern="1200" dirty="0"/>
+            <a:t>Item 5 </a:t>
+          </a:r>
+          <a:r>
+            <a:rPr lang="en-US" sz="1100" b="0" kern="1200" dirty="0"/>
+            <a:t>Use a CNN to classify the skin cancer type</a:t>
+          </a:r>
+        </a:p>
+        <a:p>
+          <a:pPr marL="0" lvl="0" indent="0" algn="l" defTabSz="488950">
+            <a:lnSpc>
+              <a:spcPct val="90000"/>
+            </a:lnSpc>
+            <a:spcBef>
+              <a:spcPct val="0"/>
+            </a:spcBef>
+            <a:spcAft>
+              <a:spcPct val="35000"/>
+            </a:spcAft>
+            <a:buNone/>
+          </a:pPr>
+          <a:r>
+            <a:rPr lang="en-US" sz="1100" b="1" kern="1200" dirty="0"/>
+            <a:t>Item 6 </a:t>
+          </a:r>
+          <a:r>
+            <a:rPr lang="en-US" sz="1100" b="0" kern="1200" dirty="0"/>
+            <a:t>Establish a repeatable pipeline for training and exporting the ML model.</a:t>
+          </a:r>
+        </a:p>
+        <a:p>
+          <a:pPr marL="0" lvl="0" indent="0" algn="l" defTabSz="488950">
+            <a:lnSpc>
+              <a:spcPct val="90000"/>
+            </a:lnSpc>
+            <a:spcBef>
+              <a:spcPct val="0"/>
+            </a:spcBef>
+            <a:spcAft>
+              <a:spcPct val="35000"/>
+            </a:spcAft>
+            <a:buNone/>
+          </a:pPr>
+          <a:r>
+            <a:rPr lang="en-US" sz="1100" b="1" kern="1200" dirty="0"/>
+            <a:t>Item 7 </a:t>
+          </a:r>
+          <a:r>
+            <a:rPr lang="en-US" sz="1100" b="0" kern="1200" dirty="0"/>
+            <a:t>Test the ML model for accuracy and reliability.</a:t>
           </a:r>
         </a:p>
       </dsp:txBody>
       <dsp:txXfrm>
-        <a:off x="2857500" y="915"/>
-        <a:ext cx="8572500" cy="1278893"/>
+        <a:off x="2857500" y="1652"/>
+        <a:ext cx="8572500" cy="1678029"/>
       </dsp:txXfrm>
     </dsp:sp>
   </dsp:spTree>
@@ -5357,8 +5817,8 @@
       </dsp:nvSpPr>
       <dsp:spPr>
         <a:xfrm>
-          <a:off x="0" y="4514"/>
-          <a:ext cx="7612407" cy="961495"/>
+          <a:off x="0" y="3080"/>
+          <a:ext cx="10033200" cy="656197"/>
         </a:xfrm>
         <a:prstGeom prst="roundRect">
           <a:avLst>
@@ -5399,8 +5859,8 @@
       </dsp:nvSpPr>
       <dsp:spPr>
         <a:xfrm>
-          <a:off x="290852" y="220850"/>
-          <a:ext cx="528822" cy="528822"/>
+          <a:off x="198499" y="150725"/>
+          <a:ext cx="360908" cy="360908"/>
         </a:xfrm>
         <a:prstGeom prst="rect">
           <a:avLst/>
@@ -5448,8 +5908,8 @@
       </dsp:nvSpPr>
       <dsp:spPr>
         <a:xfrm>
-          <a:off x="1110527" y="4514"/>
-          <a:ext cx="3425583" cy="961495"/>
+          <a:off x="757908" y="3080"/>
+          <a:ext cx="4514940" cy="656197"/>
         </a:xfrm>
         <a:prstGeom prst="rect">
           <a:avLst/>
@@ -5473,7 +5933,7 @@
         <a:fontRef idx="minor"/>
       </dsp:style>
       <dsp:txBody>
-        <a:bodyPr spcFirstLastPara="0" vert="horz" wrap="square" lIns="101758" tIns="101758" rIns="101758" bIns="101758" numCol="1" spcCol="1270" anchor="ctr" anchorCtr="0">
+        <a:bodyPr spcFirstLastPara="0" vert="horz" wrap="square" lIns="69448" tIns="69448" rIns="69448" bIns="69448" numCol="1" spcCol="1270" anchor="ctr" anchorCtr="0">
           <a:noAutofit/>
         </a:bodyPr>
         <a:lstStyle/>
@@ -5498,8 +5958,8 @@
         </a:p>
       </dsp:txBody>
       <dsp:txXfrm>
-        <a:off x="1110527" y="4514"/>
-        <a:ext cx="3425583" cy="961495"/>
+        <a:off x="757908" y="3080"/>
+        <a:ext cx="4514940" cy="656197"/>
       </dsp:txXfrm>
     </dsp:sp>
     <dsp:sp modelId="{420110E1-B393-4F23-8EA1-44A5565CB0D6}">
@@ -5509,8 +5969,8 @@
       </dsp:nvSpPr>
       <dsp:spPr>
         <a:xfrm>
-          <a:off x="4536110" y="4514"/>
-          <a:ext cx="3076296" cy="961495"/>
+          <a:off x="5272848" y="3080"/>
+          <a:ext cx="4760351" cy="656197"/>
         </a:xfrm>
         <a:prstGeom prst="rect">
           <a:avLst/>
@@ -5534,7 +5994,7 @@
         <a:fontRef idx="minor"/>
       </dsp:style>
       <dsp:txBody>
-        <a:bodyPr spcFirstLastPara="0" vert="horz" wrap="square" lIns="101758" tIns="101758" rIns="101758" bIns="101758" numCol="1" spcCol="1270" anchor="ctr" anchorCtr="0">
+        <a:bodyPr spcFirstLastPara="0" vert="horz" wrap="square" lIns="69448" tIns="69448" rIns="69448" bIns="69448" numCol="1" spcCol="1270" anchor="ctr" anchorCtr="0">
           <a:noAutofit/>
         </a:bodyPr>
         <a:lstStyle/>
@@ -5558,8 +6018,8 @@
         </a:p>
       </dsp:txBody>
       <dsp:txXfrm>
-        <a:off x="4536110" y="4514"/>
-        <a:ext cx="3076296" cy="961495"/>
+        <a:off x="5272848" y="3080"/>
+        <a:ext cx="4760351" cy="656197"/>
       </dsp:txXfrm>
     </dsp:sp>
     <dsp:sp modelId="{2025F762-80D5-4AF7-B1C8-2474CB93FD7F}">
@@ -5569,8 +6029,8 @@
       </dsp:nvSpPr>
       <dsp:spPr>
         <a:xfrm>
-          <a:off x="0" y="1206383"/>
-          <a:ext cx="7612407" cy="961495"/>
+          <a:off x="0" y="823327"/>
+          <a:ext cx="10033200" cy="656197"/>
         </a:xfrm>
         <a:prstGeom prst="roundRect">
           <a:avLst>
@@ -5611,8 +6071,8 @@
       </dsp:nvSpPr>
       <dsp:spPr>
         <a:xfrm>
-          <a:off x="290852" y="1422719"/>
-          <a:ext cx="528822" cy="528822"/>
+          <a:off x="198499" y="970972"/>
+          <a:ext cx="360908" cy="360908"/>
         </a:xfrm>
         <a:prstGeom prst="rect">
           <a:avLst/>
@@ -5660,8 +6120,8 @@
       </dsp:nvSpPr>
       <dsp:spPr>
         <a:xfrm>
-          <a:off x="1110527" y="1206383"/>
-          <a:ext cx="3425583" cy="961495"/>
+          <a:off x="757908" y="823327"/>
+          <a:ext cx="4514940" cy="656197"/>
         </a:xfrm>
         <a:prstGeom prst="rect">
           <a:avLst/>
@@ -5685,7 +6145,7 @@
         <a:fontRef idx="minor"/>
       </dsp:style>
       <dsp:txBody>
-        <a:bodyPr spcFirstLastPara="0" vert="horz" wrap="square" lIns="101758" tIns="101758" rIns="101758" bIns="101758" numCol="1" spcCol="1270" anchor="ctr" anchorCtr="0">
+        <a:bodyPr spcFirstLastPara="0" vert="horz" wrap="square" lIns="69448" tIns="69448" rIns="69448" bIns="69448" numCol="1" spcCol="1270" anchor="ctr" anchorCtr="0">
           <a:noAutofit/>
         </a:bodyPr>
         <a:lstStyle/>
@@ -5710,8 +6170,8 @@
         </a:p>
       </dsp:txBody>
       <dsp:txXfrm>
-        <a:off x="1110527" y="1206383"/>
-        <a:ext cx="3425583" cy="961495"/>
+        <a:off x="757908" y="823327"/>
+        <a:ext cx="4514940" cy="656197"/>
       </dsp:txXfrm>
     </dsp:sp>
     <dsp:sp modelId="{AB02FF91-E36D-4EFB-BEF7-AD2CA7310F6B}">
@@ -5721,8 +6181,8 @@
       </dsp:nvSpPr>
       <dsp:spPr>
         <a:xfrm>
-          <a:off x="4536110" y="1206383"/>
-          <a:ext cx="3076296" cy="961495"/>
+          <a:off x="5272848" y="823327"/>
+          <a:ext cx="4760351" cy="656197"/>
         </a:xfrm>
         <a:prstGeom prst="rect">
           <a:avLst/>
@@ -5746,7 +6206,7 @@
         <a:fontRef idx="minor"/>
       </dsp:style>
       <dsp:txBody>
-        <a:bodyPr spcFirstLastPara="0" vert="horz" wrap="square" lIns="101758" tIns="101758" rIns="101758" bIns="101758" numCol="1" spcCol="1270" anchor="ctr" anchorCtr="0">
+        <a:bodyPr spcFirstLastPara="0" vert="horz" wrap="square" lIns="69448" tIns="69448" rIns="69448" bIns="69448" numCol="1" spcCol="1270" anchor="ctr" anchorCtr="0">
           <a:noAutofit/>
         </a:bodyPr>
         <a:lstStyle/>
@@ -5764,14 +6224,19 @@
             <a:buNone/>
           </a:pPr>
           <a:r>
-            <a:rPr lang="en-US" sz="1800" kern="1200"/>
-            <a:t>Node.js / JavaScript / ASP.NET Core</a:t>
+            <a:rPr lang="en-US" sz="1800" kern="1200" dirty="0"/>
+            <a:t>Node.js / JavaScript / ASP.NET Core or </a:t>
           </a:r>
+          <a:r>
+            <a:rPr lang="en-US" sz="1800" kern="1200" dirty="0" err="1"/>
+            <a:t>Express.js</a:t>
+          </a:r>
+          <a:endParaRPr lang="en-US" sz="1800" kern="1200" dirty="0"/>
         </a:p>
       </dsp:txBody>
       <dsp:txXfrm>
-        <a:off x="4536110" y="1206383"/>
-        <a:ext cx="3076296" cy="961495"/>
+        <a:off x="5272848" y="823327"/>
+        <a:ext cx="4760351" cy="656197"/>
       </dsp:txXfrm>
     </dsp:sp>
     <dsp:sp modelId="{8548DEA7-3760-41F2-AB95-EF976CB827FE}">
@@ -5781,8 +6246,8 @@
       </dsp:nvSpPr>
       <dsp:spPr>
         <a:xfrm>
-          <a:off x="0" y="2408252"/>
-          <a:ext cx="7612407" cy="961495"/>
+          <a:off x="0" y="1643575"/>
+          <a:ext cx="10033200" cy="656197"/>
         </a:xfrm>
         <a:prstGeom prst="roundRect">
           <a:avLst>
@@ -5823,8 +6288,8 @@
       </dsp:nvSpPr>
       <dsp:spPr>
         <a:xfrm>
-          <a:off x="290852" y="2624588"/>
-          <a:ext cx="528822" cy="528822"/>
+          <a:off x="198499" y="1791219"/>
+          <a:ext cx="360908" cy="360908"/>
         </a:xfrm>
         <a:prstGeom prst="rect">
           <a:avLst/>
@@ -5870,8 +6335,8 @@
       </dsp:nvSpPr>
       <dsp:spPr>
         <a:xfrm>
-          <a:off x="1110527" y="2408252"/>
-          <a:ext cx="3425583" cy="961495"/>
+          <a:off x="757908" y="1643575"/>
+          <a:ext cx="4514940" cy="656197"/>
         </a:xfrm>
         <a:prstGeom prst="rect">
           <a:avLst/>
@@ -5895,7 +6360,7 @@
         <a:fontRef idx="minor"/>
       </dsp:style>
       <dsp:txBody>
-        <a:bodyPr spcFirstLastPara="0" vert="horz" wrap="square" lIns="101758" tIns="101758" rIns="101758" bIns="101758" numCol="1" spcCol="1270" anchor="ctr" anchorCtr="0">
+        <a:bodyPr spcFirstLastPara="0" vert="horz" wrap="square" lIns="69448" tIns="69448" rIns="69448" bIns="69448" numCol="1" spcCol="1270" anchor="ctr" anchorCtr="0">
           <a:noAutofit/>
         </a:bodyPr>
         <a:lstStyle/>
@@ -5920,8 +6385,8 @@
         </a:p>
       </dsp:txBody>
       <dsp:txXfrm>
-        <a:off x="1110527" y="2408252"/>
-        <a:ext cx="3425583" cy="961495"/>
+        <a:off x="757908" y="1643575"/>
+        <a:ext cx="4514940" cy="656197"/>
       </dsp:txXfrm>
     </dsp:sp>
     <dsp:sp modelId="{CD955C96-043B-447F-8ACF-E905751ED813}">
@@ -5931,8 +6396,8 @@
       </dsp:nvSpPr>
       <dsp:spPr>
         <a:xfrm>
-          <a:off x="4536110" y="2408252"/>
-          <a:ext cx="3076296" cy="961495"/>
+          <a:off x="5272848" y="1643575"/>
+          <a:ext cx="4760351" cy="656197"/>
         </a:xfrm>
         <a:prstGeom prst="rect">
           <a:avLst/>
@@ -5956,7 +6421,7 @@
         <a:fontRef idx="minor"/>
       </dsp:style>
       <dsp:txBody>
-        <a:bodyPr spcFirstLastPara="0" vert="horz" wrap="square" lIns="101758" tIns="101758" rIns="101758" bIns="101758" numCol="1" spcCol="1270" anchor="ctr" anchorCtr="0">
+        <a:bodyPr spcFirstLastPara="0" vert="horz" wrap="square" lIns="69448" tIns="69448" rIns="69448" bIns="69448" numCol="1" spcCol="1270" anchor="ctr" anchorCtr="0">
           <a:noAutofit/>
         </a:bodyPr>
         <a:lstStyle/>
@@ -5980,8 +6445,8 @@
         </a:p>
       </dsp:txBody>
       <dsp:txXfrm>
-        <a:off x="4536110" y="2408252"/>
-        <a:ext cx="3076296" cy="961495"/>
+        <a:off x="5272848" y="1643575"/>
+        <a:ext cx="4760351" cy="656197"/>
       </dsp:txXfrm>
     </dsp:sp>
     <dsp:sp modelId="{8578CD0B-2C26-4312-A213-DA61044FFC51}">
@@ -5991,8 +6456,8 @@
       </dsp:nvSpPr>
       <dsp:spPr>
         <a:xfrm>
-          <a:off x="0" y="3610121"/>
-          <a:ext cx="7612407" cy="961495"/>
+          <a:off x="0" y="2463822"/>
+          <a:ext cx="10033200" cy="656197"/>
         </a:xfrm>
         <a:prstGeom prst="roundRect">
           <a:avLst>
@@ -6033,8 +6498,8 @@
       </dsp:nvSpPr>
       <dsp:spPr>
         <a:xfrm>
-          <a:off x="290852" y="3826457"/>
-          <a:ext cx="528822" cy="528822"/>
+          <a:off x="198499" y="2611466"/>
+          <a:ext cx="360908" cy="360908"/>
         </a:xfrm>
         <a:prstGeom prst="rect">
           <a:avLst/>
@@ -6082,8 +6547,8 @@
       </dsp:nvSpPr>
       <dsp:spPr>
         <a:xfrm>
-          <a:off x="1110527" y="3610121"/>
-          <a:ext cx="3425583" cy="961495"/>
+          <a:off x="757908" y="2463822"/>
+          <a:ext cx="4514940" cy="656197"/>
         </a:xfrm>
         <a:prstGeom prst="rect">
           <a:avLst/>
@@ -6107,7 +6572,7 @@
         <a:fontRef idx="minor"/>
       </dsp:style>
       <dsp:txBody>
-        <a:bodyPr spcFirstLastPara="0" vert="horz" wrap="square" lIns="101758" tIns="101758" rIns="101758" bIns="101758" numCol="1" spcCol="1270" anchor="ctr" anchorCtr="0">
+        <a:bodyPr spcFirstLastPara="0" vert="horz" wrap="square" lIns="69448" tIns="69448" rIns="69448" bIns="69448" numCol="1" spcCol="1270" anchor="ctr" anchorCtr="0">
           <a:noAutofit/>
         </a:bodyPr>
         <a:lstStyle/>
@@ -6132,8 +6597,8 @@
         </a:p>
       </dsp:txBody>
       <dsp:txXfrm>
-        <a:off x="1110527" y="3610121"/>
-        <a:ext cx="3425583" cy="961495"/>
+        <a:off x="757908" y="2463822"/>
+        <a:ext cx="4514940" cy="656197"/>
       </dsp:txXfrm>
     </dsp:sp>
     <dsp:sp modelId="{8BF929A2-F304-4B34-8C85-6417681F6386}">
@@ -6143,8 +6608,8 @@
       </dsp:nvSpPr>
       <dsp:spPr>
         <a:xfrm>
-          <a:off x="4536110" y="3610121"/>
-          <a:ext cx="3076296" cy="961495"/>
+          <a:off x="5272848" y="2463822"/>
+          <a:ext cx="4760351" cy="656197"/>
         </a:xfrm>
         <a:prstGeom prst="rect">
           <a:avLst/>
@@ -6168,7 +6633,7 @@
         <a:fontRef idx="minor"/>
       </dsp:style>
       <dsp:txBody>
-        <a:bodyPr spcFirstLastPara="0" vert="horz" wrap="square" lIns="101758" tIns="101758" rIns="101758" bIns="101758" numCol="1" spcCol="1270" anchor="ctr" anchorCtr="0">
+        <a:bodyPr spcFirstLastPara="0" vert="horz" wrap="square" lIns="69448" tIns="69448" rIns="69448" bIns="69448" numCol="1" spcCol="1270" anchor="ctr" anchorCtr="0">
           <a:noAutofit/>
         </a:bodyPr>
         <a:lstStyle/>
@@ -6186,14 +6651,14 @@
             <a:buNone/>
           </a:pPr>
           <a:r>
-            <a:rPr lang="en-US" sz="1800" kern="1200"/>
+            <a:rPr lang="en-US" sz="1800" kern="1200" dirty="0"/>
             <a:t>OpenCV / PIL</a:t>
           </a:r>
         </a:p>
       </dsp:txBody>
       <dsp:txXfrm>
-        <a:off x="4536110" y="3610121"/>
-        <a:ext cx="3076296" cy="961495"/>
+        <a:off x="5272848" y="2463822"/>
+        <a:ext cx="4760351" cy="656197"/>
       </dsp:txXfrm>
     </dsp:sp>
     <dsp:sp modelId="{6E794A56-620F-478A-8D66-04AD9771EF05}">
@@ -6203,8 +6668,8 @@
       </dsp:nvSpPr>
       <dsp:spPr>
         <a:xfrm>
-          <a:off x="0" y="4811990"/>
-          <a:ext cx="7612407" cy="961495"/>
+          <a:off x="0" y="3284069"/>
+          <a:ext cx="10033200" cy="656197"/>
         </a:xfrm>
         <a:prstGeom prst="roundRect">
           <a:avLst>
@@ -6245,8 +6710,8 @@
       </dsp:nvSpPr>
       <dsp:spPr>
         <a:xfrm>
-          <a:off x="290852" y="5028327"/>
-          <a:ext cx="528822" cy="528822"/>
+          <a:off x="198499" y="3431714"/>
+          <a:ext cx="360908" cy="360908"/>
         </a:xfrm>
         <a:prstGeom prst="rect">
           <a:avLst/>
@@ -6294,8 +6759,8 @@
       </dsp:nvSpPr>
       <dsp:spPr>
         <a:xfrm>
-          <a:off x="1110527" y="4811990"/>
-          <a:ext cx="3425583" cy="961495"/>
+          <a:off x="757908" y="3284069"/>
+          <a:ext cx="4514940" cy="656197"/>
         </a:xfrm>
         <a:prstGeom prst="rect">
           <a:avLst/>
@@ -6319,7 +6784,7 @@
         <a:fontRef idx="minor"/>
       </dsp:style>
       <dsp:txBody>
-        <a:bodyPr spcFirstLastPara="0" vert="horz" wrap="square" lIns="101758" tIns="101758" rIns="101758" bIns="101758" numCol="1" spcCol="1270" anchor="ctr" anchorCtr="0">
+        <a:bodyPr spcFirstLastPara="0" vert="horz" wrap="square" lIns="69448" tIns="69448" rIns="69448" bIns="69448" numCol="1" spcCol="1270" anchor="ctr" anchorCtr="0">
           <a:noAutofit/>
         </a:bodyPr>
         <a:lstStyle/>
@@ -6344,8 +6809,8 @@
         </a:p>
       </dsp:txBody>
       <dsp:txXfrm>
-        <a:off x="1110527" y="4811990"/>
-        <a:ext cx="3425583" cy="961495"/>
+        <a:off x="757908" y="3284069"/>
+        <a:ext cx="4514940" cy="656197"/>
       </dsp:txXfrm>
     </dsp:sp>
     <dsp:sp modelId="{85630522-1C3A-4BDA-8102-EB541A5C4984}">
@@ -6355,8 +6820,8 @@
       </dsp:nvSpPr>
       <dsp:spPr>
         <a:xfrm>
-          <a:off x="4536110" y="4811990"/>
-          <a:ext cx="3076296" cy="961495"/>
+          <a:off x="5272848" y="3284069"/>
+          <a:ext cx="4760351" cy="656197"/>
         </a:xfrm>
         <a:prstGeom prst="rect">
           <a:avLst/>
@@ -6380,7 +6845,7 @@
         <a:fontRef idx="minor"/>
       </dsp:style>
       <dsp:txBody>
-        <a:bodyPr spcFirstLastPara="0" vert="horz" wrap="square" lIns="101758" tIns="101758" rIns="101758" bIns="101758" numCol="1" spcCol="1270" anchor="ctr" anchorCtr="0">
+        <a:bodyPr spcFirstLastPara="0" vert="horz" wrap="square" lIns="69448" tIns="69448" rIns="69448" bIns="69448" numCol="1" spcCol="1270" anchor="ctr" anchorCtr="0">
           <a:noAutofit/>
         </a:bodyPr>
         <a:lstStyle/>
@@ -6398,14 +6863,14 @@
             <a:buNone/>
           </a:pPr>
           <a:r>
-            <a:rPr lang="en-US" sz="1800" kern="1200"/>
+            <a:rPr lang="en-US" sz="1800" kern="1200" dirty="0"/>
             <a:t>GitHub Actions / Docker / Azure</a:t>
           </a:r>
         </a:p>
       </dsp:txBody>
       <dsp:txXfrm>
-        <a:off x="4536110" y="4811990"/>
-        <a:ext cx="3076296" cy="961495"/>
+        <a:off x="5272848" y="3284069"/>
+        <a:ext cx="4760351" cy="656197"/>
       </dsp:txXfrm>
     </dsp:sp>
   </dsp:spTree>
@@ -10465,7 +10930,7 @@
           <a:p>
             <a:fld id="{4EC743F4-8769-40B4-85DF-6CB8DE9F66AA}" type="datetimeFigureOut">
               <a:rPr lang="en-US" smtClean="0"/>
-              <a:t>1/30/25</a:t>
+              <a:t>1/31/25</a:t>
             </a:fld>
             <a:endParaRPr lang="en-US"/>
           </a:p>
@@ -11008,7 +11473,7 @@
           <a:p>
             <a:fld id="{4EC743F4-8769-40B4-85DF-6CB8DE9F66AA}" type="datetimeFigureOut">
               <a:rPr lang="en-US" smtClean="0"/>
-              <a:t>1/30/25</a:t>
+              <a:t>1/31/25</a:t>
             </a:fld>
             <a:endParaRPr lang="en-US"/>
           </a:p>
@@ -11216,7 +11681,7 @@
           <a:p>
             <a:fld id="{4EC743F4-8769-40B4-85DF-6CB8DE9F66AA}" type="datetimeFigureOut">
               <a:rPr lang="en-US" smtClean="0"/>
-              <a:t>1/30/25</a:t>
+              <a:t>1/31/25</a:t>
             </a:fld>
             <a:endParaRPr lang="en-US"/>
           </a:p>
@@ -11415,7 +11880,7 @@
           <a:p>
             <a:fld id="{4EC743F4-8769-40B4-85DF-6CB8DE9F66AA}" type="datetimeFigureOut">
               <a:rPr lang="en-US" smtClean="0"/>
-              <a:t>1/30/25</a:t>
+              <a:t>1/31/25</a:t>
             </a:fld>
             <a:endParaRPr lang="en-US"/>
           </a:p>
@@ -11698,7 +12163,7 @@
           <a:p>
             <a:fld id="{4EC743F4-8769-40B4-85DF-6CB8DE9F66AA}" type="datetimeFigureOut">
               <a:rPr lang="en-US" smtClean="0"/>
-              <a:t>1/30/25</a:t>
+              <a:t>1/31/25</a:t>
             </a:fld>
             <a:endParaRPr lang="en-US" dirty="0"/>
           </a:p>
@@ -12649,7 +13114,7 @@
           <a:p>
             <a:fld id="{4EC743F4-8769-40B4-85DF-6CB8DE9F66AA}" type="datetimeFigureOut">
               <a:rPr lang="en-US" smtClean="0"/>
-              <a:t>1/30/25</a:t>
+              <a:t>1/31/25</a:t>
             </a:fld>
             <a:endParaRPr lang="en-US"/>
           </a:p>
@@ -13068,7 +13533,7 @@
           <a:p>
             <a:fld id="{4EC743F4-8769-40B4-85DF-6CB8DE9F66AA}" type="datetimeFigureOut">
               <a:rPr lang="en-US" smtClean="0"/>
-              <a:t>1/30/25</a:t>
+              <a:t>1/31/25</a:t>
             </a:fld>
             <a:endParaRPr lang="en-US"/>
           </a:p>
@@ -13209,7 +13674,7 @@
           <a:p>
             <a:fld id="{4EC743F4-8769-40B4-85DF-6CB8DE9F66AA}" type="datetimeFigureOut">
               <a:rPr lang="en-US" smtClean="0"/>
-              <a:t>1/30/25</a:t>
+              <a:t>1/31/25</a:t>
             </a:fld>
             <a:endParaRPr lang="en-US"/>
           </a:p>
@@ -13322,7 +13787,7 @@
           <a:p>
             <a:fld id="{4EC743F4-8769-40B4-85DF-6CB8DE9F66AA}" type="datetimeFigureOut">
               <a:rPr lang="en-US" smtClean="0"/>
-              <a:t>1/30/25</a:t>
+              <a:t>1/31/25</a:t>
             </a:fld>
             <a:endParaRPr lang="en-US"/>
           </a:p>
@@ -13639,7 +14104,7 @@
           <a:p>
             <a:fld id="{4EC743F4-8769-40B4-85DF-6CB8DE9F66AA}" type="datetimeFigureOut">
               <a:rPr lang="en-US" smtClean="0"/>
-              <a:t>1/30/25</a:t>
+              <a:t>1/31/25</a:t>
             </a:fld>
             <a:endParaRPr lang="en-US"/>
           </a:p>
@@ -13984,7 +14449,7 @@
           <a:p>
             <a:fld id="{4EC743F4-8769-40B4-85DF-6CB8DE9F66AA}" type="datetimeFigureOut">
               <a:rPr lang="en-US" smtClean="0"/>
-              <a:t>1/30/25</a:t>
+              <a:t>1/31/25</a:t>
             </a:fld>
             <a:endParaRPr lang="en-US"/>
           </a:p>
@@ -14279,7 +14744,7 @@
             <a:fld id="{4EC743F4-8769-40B4-85DF-6CB8DE9F66AA}" type="datetimeFigureOut">
               <a:rPr lang="en-US" smtClean="0"/>
               <a:pPr/>
-              <a:t>1/30/25</a:t>
+              <a:t>1/31/25</a:t>
             </a:fld>
             <a:endParaRPr lang="en-US" dirty="0"/>
           </a:p>
@@ -15733,7 +16198,7 @@
     <p:bg>
       <p:bgPr>
         <a:solidFill>
-          <a:schemeClr val="bg2"/>
+          <a:schemeClr val="tx1"/>
         </a:solidFill>
         <a:effectLst/>
       </p:bgPr>
@@ -15859,6 +16324,9 @@
             <a:pPr algn="ctr"/>
             <a:r>
               <a:rPr lang="en-US" sz="3600" dirty="0">
+                <a:solidFill>
+                  <a:schemeClr val="bg2"/>
+                </a:solidFill>
                 <a:latin typeface="+mn-lt"/>
               </a:rPr>
               <a:t>Team Workspaces:</a:t>
@@ -15947,7 +16415,13 @@
           <a:lstStyle/>
           <a:p>
             <a:r>
-              <a:rPr lang="en-US" sz="1800" dirty="0"/>
+              <a:rPr lang="en-US" sz="1800" dirty="0">
+                <a:solidFill>
+                  <a:schemeClr val="bg2">
+                    <a:alpha val="60000"/>
+                  </a:schemeClr>
+                </a:solidFill>
+              </a:rPr>
               <a:t>Trello: </a:t>
             </a:r>
             <a:r>
@@ -15960,7 +16434,13 @@
           </a:p>
           <a:p>
             <a:r>
-              <a:rPr lang="en-US" sz="1800" dirty="0"/>
+              <a:rPr lang="en-US" sz="1800" dirty="0">
+                <a:solidFill>
+                  <a:schemeClr val="bg2">
+                    <a:alpha val="60000"/>
+                  </a:schemeClr>
+                </a:solidFill>
+              </a:rPr>
               <a:t>GitHub: </a:t>
             </a:r>
             <a:r>
@@ -16027,7 +16507,7 @@
     <p:bg>
       <p:bgPr>
         <a:solidFill>
-          <a:schemeClr val="bg2"/>
+          <a:schemeClr val="tx1"/>
         </a:solidFill>
         <a:effectLst/>
       </p:bgPr>
@@ -16141,7 +16621,7 @@
         <p:spPr>
           <a:xfrm>
             <a:off x="989400" y="251461"/>
-            <a:ext cx="10213200" cy="1390902"/>
+            <a:ext cx="10213200" cy="820100"/>
           </a:xfrm>
         </p:spPr>
         <p:txBody>
@@ -16152,7 +16632,10 @@
           <a:p>
             <a:pPr algn="ctr"/>
             <a:r>
-              <a:rPr lang="en-US" sz="3600" dirty="0">
+              <a:rPr lang="en-US" dirty="0">
+                <a:solidFill>
+                  <a:schemeClr val="bg2"/>
+                </a:solidFill>
                 <a:latin typeface="+mn-lt"/>
               </a:rPr>
               <a:t>Backlog Management</a:t>
@@ -16228,14 +16711,14 @@
             <p:ph idx="1"/>
             <p:extLst>
               <p:ext uri="{D42A27DB-BD31-4B8C-83A1-F6EECF244321}">
-                <p14:modId xmlns:p14="http://schemas.microsoft.com/office/powerpoint/2010/main" val="3465533323"/>
+                <p14:modId xmlns:p14="http://schemas.microsoft.com/office/powerpoint/2010/main" val="1876485312"/>
               </p:ext>
             </p:extLst>
           </p:nvPr>
         </p:nvGraphicFramePr>
         <p:xfrm>
-          <a:off x="1079400" y="2843213"/>
-          <a:ext cx="10033200" cy="2925762"/>
+          <a:off x="242888" y="1323023"/>
+          <a:ext cx="11672887" cy="5077778"/>
         </p:xfrm>
         <a:graphic>
           <a:graphicData uri="http://schemas.openxmlformats.org/drawingml/2006/diagram">
@@ -16262,7 +16745,7 @@
     <p:bg>
       <p:bgPr>
         <a:solidFill>
-          <a:schemeClr val="bg2"/>
+          <a:schemeClr val="tx1"/>
         </a:solidFill>
         <a:effectLst/>
       </p:bgPr>
@@ -16376,17 +16859,21 @@
         <p:spPr>
           <a:xfrm>
             <a:off x="989400" y="251461"/>
-            <a:ext cx="10213200" cy="791527"/>
+            <a:ext cx="10213200" cy="548639"/>
           </a:xfrm>
         </p:spPr>
         <p:txBody>
           <a:bodyPr anchor="t">
-            <a:normAutofit/>
+            <a:noAutofit/>
           </a:bodyPr>
           <a:lstStyle/>
           <a:p>
+            <a:pPr algn="ctr"/>
             <a:r>
               <a:rPr lang="en-US" dirty="0">
+                <a:solidFill>
+                  <a:schemeClr val="bg2"/>
+                </a:solidFill>
                 <a:latin typeface="+mn-lt"/>
               </a:rPr>
               <a:t>Release Plan:</a:t>
@@ -16462,14 +16949,14 @@
             <p:ph idx="1"/>
             <p:extLst>
               <p:ext uri="{D42A27DB-BD31-4B8C-83A1-F6EECF244321}">
-                <p14:modId xmlns:p14="http://schemas.microsoft.com/office/powerpoint/2010/main" val="1928493635"/>
+                <p14:modId xmlns:p14="http://schemas.microsoft.com/office/powerpoint/2010/main" val="2632690453"/>
               </p:ext>
             </p:extLst>
           </p:nvPr>
         </p:nvGraphicFramePr>
         <p:xfrm>
-          <a:off x="371475" y="1294450"/>
-          <a:ext cx="11430000" cy="5177788"/>
+          <a:off x="371475" y="900113"/>
+          <a:ext cx="11430000" cy="5572125"/>
         </p:xfrm>
         <a:graphic>
           <a:graphicData uri="http://schemas.openxmlformats.org/drawingml/2006/diagram">
@@ -16496,7 +16983,135 @@
     <p:bg>
       <p:bgPr>
         <a:solidFill>
-          <a:schemeClr val="bg2"/>
+          <a:schemeClr val="tx1"/>
+        </a:solidFill>
+        <a:effectLst/>
+      </p:bgPr>
+    </p:bg>
+    <p:spTree>
+      <p:nvGrpSpPr>
+        <p:cNvPr id="1" name=""/>
+        <p:cNvGrpSpPr/>
+        <p:nvPr/>
+      </p:nvGrpSpPr>
+      <p:grpSpPr>
+        <a:xfrm>
+          <a:off x="0" y="0"/>
+          <a:ext cx="0" cy="0"/>
+          <a:chOff x="0" y="0"/>
+          <a:chExt cx="0" cy="0"/>
+        </a:xfrm>
+      </p:grpSpPr>
+      <p:sp>
+        <p:nvSpPr>
+          <p:cNvPr id="2" name="Title 1">
+            <a:extLst>
+              <a:ext uri="{FF2B5EF4-FFF2-40B4-BE49-F238E27FC236}">
+                <a16:creationId xmlns:a16="http://schemas.microsoft.com/office/drawing/2014/main" id="{6FE993B0-336F-1CC2-704D-BD1006100946}"/>
+              </a:ext>
+            </a:extLst>
+          </p:cNvPr>
+          <p:cNvSpPr>
+            <a:spLocks noGrp="1"/>
+          </p:cNvSpPr>
+          <p:nvPr>
+            <p:ph type="title"/>
+          </p:nvPr>
+        </p:nvSpPr>
+        <p:spPr>
+          <a:xfrm>
+            <a:off x="989400" y="395289"/>
+            <a:ext cx="10213200" cy="736595"/>
+          </a:xfrm>
+        </p:spPr>
+        <p:txBody>
+          <a:bodyPr anchor="t"/>
+          <a:lstStyle/>
+          <a:p>
+            <a:pPr algn="ctr"/>
+            <a:r>
+              <a:rPr lang="en-US" dirty="0">
+                <a:solidFill>
+                  <a:schemeClr val="bg2"/>
+                </a:solidFill>
+                <a:latin typeface="+mn-lt"/>
+              </a:rPr>
+              <a:t>Additional Stories</a:t>
+            </a:r>
+          </a:p>
+        </p:txBody>
+      </p:sp>
+      <p:sp>
+        <p:nvSpPr>
+          <p:cNvPr id="3" name="Content Placeholder 2">
+            <a:extLst>
+              <a:ext uri="{FF2B5EF4-FFF2-40B4-BE49-F238E27FC236}">
+                <a16:creationId xmlns:a16="http://schemas.microsoft.com/office/drawing/2014/main" id="{C99C0809-DCDF-EDB6-7A73-0865D7400049}"/>
+              </a:ext>
+            </a:extLst>
+          </p:cNvPr>
+          <p:cNvSpPr>
+            <a:spLocks noGrp="1"/>
+          </p:cNvSpPr>
+          <p:nvPr>
+            <p:ph idx="1"/>
+          </p:nvPr>
+        </p:nvSpPr>
+        <p:spPr>
+          <a:xfrm>
+            <a:off x="989400" y="1371601"/>
+            <a:ext cx="10213200" cy="4354516"/>
+          </a:xfrm>
+        </p:spPr>
+        <p:txBody>
+          <a:bodyPr/>
+          <a:lstStyle/>
+          <a:p>
+            <a:r>
+              <a:rPr lang="en-US" dirty="0">
+                <a:solidFill>
+                  <a:schemeClr val="bg2">
+                    <a:alpha val="60000"/>
+                  </a:schemeClr>
+                </a:solidFill>
+              </a:rPr>
+              <a:t>Test and optimize backend API response time to ensure real-time diagnosis feedback.</a:t>
+            </a:r>
+          </a:p>
+          <a:p>
+            <a:r>
+              <a:rPr lang="en-US" dirty="0">
+                <a:solidFill>
+                  <a:schemeClr val="bg2">
+                    <a:alpha val="60000"/>
+                  </a:schemeClr>
+                </a:solidFill>
+              </a:rPr>
+              <a:t>Integrate a visualization tool to show model confidence in predictions.</a:t>
+            </a:r>
+          </a:p>
+        </p:txBody>
+      </p:sp>
+    </p:spTree>
+    <p:extLst>
+      <p:ext uri="{BB962C8B-B14F-4D97-AF65-F5344CB8AC3E}">
+        <p14:creationId xmlns:p14="http://schemas.microsoft.com/office/powerpoint/2010/main" val="2691201154"/>
+      </p:ext>
+    </p:extLst>
+  </p:cSld>
+  <p:clrMapOvr>
+    <a:masterClrMapping/>
+  </p:clrMapOvr>
+</p:sld>
+</file>
+
+<file path=ppt/slides/slide6.xml><?xml version="1.0" encoding="utf-8"?>
+<p:sld xmlns:a="http://schemas.openxmlformats.org/drawingml/2006/main" xmlns:r="http://schemas.openxmlformats.org/officeDocument/2006/relationships" xmlns:p="http://schemas.openxmlformats.org/presentationml/2006/main">
+  <p:cSld>
+    <p:bg>
+      <p:bgPr>
+        <a:solidFill>
+          <a:schemeClr val="tx1"/>
         </a:solidFill>
         <a:effectLst/>
       </p:bgPr>
@@ -16517,10 +17132,10 @@
       </p:grpSpPr>
       <p:sp useBgFill="1">
         <p:nvSpPr>
-          <p:cNvPr id="9" name="Rectangle 8">
+          <p:cNvPr id="16" name="Rectangle 15">
             <a:extLst>
               <a:ext uri="{FF2B5EF4-FFF2-40B4-BE49-F238E27FC236}">
-                <a16:creationId xmlns:a16="http://schemas.microsoft.com/office/drawing/2014/main" id="{EEE96A74-B62B-4642-AB22-7776A5F48CE7}"/>
+                <a16:creationId xmlns:a16="http://schemas.microsoft.com/office/drawing/2014/main" id="{DB66C9CD-6BF4-44CA-8078-0BB819080761}"/>
               </a:ext>
               <a:ext uri="{C183D7F6-B498-43B3-948B-1728B52AA6E4}">
                 <adec:decorative xmlns:adec="http://schemas.microsoft.com/office/drawing/2017/decorative" val="1"/>
@@ -16609,18 +17224,22 @@
         </p:nvSpPr>
         <p:spPr>
           <a:xfrm>
-            <a:off x="990000" y="946800"/>
-            <a:ext cx="2802386" cy="4689475"/>
+            <a:off x="989400" y="251461"/>
+            <a:ext cx="10213200" cy="1390902"/>
           </a:xfrm>
         </p:spPr>
         <p:txBody>
-          <a:bodyPr anchor="t">
+          <a:bodyPr anchor="ctr">
             <a:normAutofit/>
           </a:bodyPr>
           <a:lstStyle/>
           <a:p>
+            <a:pPr algn="ctr"/>
             <a:r>
               <a:rPr lang="en-US" dirty="0">
+                <a:solidFill>
+                  <a:schemeClr val="bg2"/>
+                </a:solidFill>
                 <a:latin typeface="+mn-lt"/>
               </a:rPr>
               <a:t>Technology Stack</a:t>
@@ -16630,10 +17249,10 @@
       </p:sp>
       <p:cxnSp>
         <p:nvCxnSpPr>
-          <p:cNvPr id="11" name="Straight Connector 10">
+          <p:cNvPr id="18" name="Straight Connector 17">
             <a:extLst>
               <a:ext uri="{FF2B5EF4-FFF2-40B4-BE49-F238E27FC236}">
-                <a16:creationId xmlns:a16="http://schemas.microsoft.com/office/drawing/2014/main" id="{9B4757C4-228A-47E5-94C8-058312AB27F8}"/>
+                <a16:creationId xmlns:a16="http://schemas.microsoft.com/office/drawing/2014/main" id="{D9BF9BF3-7E9D-458B-A5D2-E730C5FFD0CD}"/>
               </a:ext>
               <a:ext uri="{C183D7F6-B498-43B3-948B-1728B52AA6E4}">
                 <adec:decorative xmlns:adec="http://schemas.microsoft.com/office/drawing/2017/decorative" val="1"/>
@@ -16653,8 +17272,8 @@
         </p:nvCxnSpPr>
         <p:spPr>
           <a:xfrm>
-            <a:off x="4432300" y="540000"/>
-            <a:ext cx="0" cy="5778000"/>
+            <a:off x="5819649" y="1893832"/>
+            <a:ext cx="540000" cy="0"/>
           </a:xfrm>
           <a:prstGeom prst="line">
             <a:avLst/>
@@ -16696,14 +17315,14 @@
             <p:ph idx="1"/>
             <p:extLst>
               <p:ext uri="{D42A27DB-BD31-4B8C-83A1-F6EECF244321}">
-                <p14:modId xmlns:p14="http://schemas.microsoft.com/office/powerpoint/2010/main" val="2810840146"/>
+                <p14:modId xmlns:p14="http://schemas.microsoft.com/office/powerpoint/2010/main" val="2336954711"/>
               </p:ext>
             </p:extLst>
           </p:nvPr>
         </p:nvGraphicFramePr>
         <p:xfrm>
-          <a:off x="4038600" y="537330"/>
-          <a:ext cx="7612407" cy="5778000"/>
+          <a:off x="1079400" y="2386014"/>
+          <a:ext cx="10033200" cy="3943348"/>
         </p:xfrm>
         <a:graphic>
           <a:graphicData uri="http://schemas.openxmlformats.org/drawingml/2006/diagram">
@@ -16724,9 +17343,17 @@
 </p:sld>
 </file>
 
-<file path=ppt/slides/slide6.xml><?xml version="1.0" encoding="utf-8"?>
+<file path=ppt/slides/slide7.xml><?xml version="1.0" encoding="utf-8"?>
 <p:sld xmlns:a="http://schemas.openxmlformats.org/drawingml/2006/main" xmlns:r="http://schemas.openxmlformats.org/officeDocument/2006/relationships" xmlns:p="http://schemas.openxmlformats.org/presentationml/2006/main">
   <p:cSld>
+    <p:bg>
+      <p:bgPr>
+        <a:solidFill>
+          <a:schemeClr val="tx1"/>
+        </a:solidFill>
+        <a:effectLst/>
+      </p:bgPr>
+    </p:bg>
     <p:spTree>
       <p:nvGrpSpPr>
         <p:cNvPr id="1" name=""/>
@@ -16760,15 +17387,19 @@
         <p:spPr>
           <a:xfrm>
             <a:off x="989400" y="395289"/>
-            <a:ext cx="10213200" cy="736598"/>
+            <a:ext cx="10213200" cy="633411"/>
           </a:xfrm>
         </p:spPr>
         <p:txBody>
           <a:bodyPr anchor="t"/>
           <a:lstStyle/>
           <a:p>
+            <a:pPr algn="ctr"/>
             <a:r>
               <a:rPr lang="en-US" dirty="0">
+                <a:solidFill>
+                  <a:schemeClr val="bg2"/>
+                </a:solidFill>
                 <a:latin typeface="+mn-lt"/>
               </a:rPr>
               <a:t>Context Diagram</a:t>
@@ -16809,94 +17440,6 @@
     <p:extLst>
       <p:ext uri="{BB962C8B-B14F-4D97-AF65-F5344CB8AC3E}">
         <p14:creationId xmlns:p14="http://schemas.microsoft.com/office/powerpoint/2010/main" val="1244146612"/>
-      </p:ext>
-    </p:extLst>
-  </p:cSld>
-  <p:clrMapOvr>
-    <a:masterClrMapping/>
-  </p:clrMapOvr>
-</p:sld>
-</file>
-
-<file path=ppt/slides/slide7.xml><?xml version="1.0" encoding="utf-8"?>
-<p:sld xmlns:a="http://schemas.openxmlformats.org/drawingml/2006/main" xmlns:r="http://schemas.openxmlformats.org/officeDocument/2006/relationships" xmlns:p="http://schemas.openxmlformats.org/presentationml/2006/main">
-  <p:cSld>
-    <p:spTree>
-      <p:nvGrpSpPr>
-        <p:cNvPr id="1" name=""/>
-        <p:cNvGrpSpPr/>
-        <p:nvPr/>
-      </p:nvGrpSpPr>
-      <p:grpSpPr>
-        <a:xfrm>
-          <a:off x="0" y="0"/>
-          <a:ext cx="0" cy="0"/>
-          <a:chOff x="0" y="0"/>
-          <a:chExt cx="0" cy="0"/>
-        </a:xfrm>
-      </p:grpSpPr>
-      <p:sp>
-        <p:nvSpPr>
-          <p:cNvPr id="2" name="Title 1">
-            <a:extLst>
-              <a:ext uri="{FF2B5EF4-FFF2-40B4-BE49-F238E27FC236}">
-                <a16:creationId xmlns:a16="http://schemas.microsoft.com/office/drawing/2014/main" id="{D76CB6FB-F419-0884-22C1-960ABCFD457E}"/>
-              </a:ext>
-            </a:extLst>
-          </p:cNvPr>
-          <p:cNvSpPr>
-            <a:spLocks noGrp="1"/>
-          </p:cNvSpPr>
-          <p:nvPr>
-            <p:ph type="title"/>
-          </p:nvPr>
-        </p:nvSpPr>
-        <p:spPr/>
-        <p:txBody>
-          <a:bodyPr anchor="t"/>
-          <a:lstStyle/>
-          <a:p>
-            <a:r>
-              <a:rPr lang="en-US" dirty="0">
-                <a:latin typeface="+mn-lt"/>
-              </a:rPr>
-              <a:t>Product Backlog	</a:t>
-            </a:r>
-          </a:p>
-        </p:txBody>
-      </p:sp>
-      <p:sp>
-        <p:nvSpPr>
-          <p:cNvPr id="3" name="Content Placeholder 2">
-            <a:extLst>
-              <a:ext uri="{FF2B5EF4-FFF2-40B4-BE49-F238E27FC236}">
-                <a16:creationId xmlns:a16="http://schemas.microsoft.com/office/drawing/2014/main" id="{B6D0A959-C9E1-BA5C-1D29-43B2C5E64B95}"/>
-              </a:ext>
-            </a:extLst>
-          </p:cNvPr>
-          <p:cNvSpPr>
-            <a:spLocks noGrp="1"/>
-          </p:cNvSpPr>
-          <p:nvPr>
-            <p:ph idx="1"/>
-          </p:nvPr>
-        </p:nvSpPr>
-        <p:spPr/>
-        <p:txBody>
-          <a:bodyPr/>
-          <a:lstStyle/>
-          <a:p>
-            <a:r>
-              <a:rPr lang="en-US" dirty="0"/>
-              <a:t>SCREENSHOT OF TRELLO SPRINT BOARD</a:t>
-            </a:r>
-          </a:p>
-        </p:txBody>
-      </p:sp>
-    </p:spTree>
-    <p:extLst>
-      <p:ext uri="{BB962C8B-B14F-4D97-AF65-F5344CB8AC3E}">
-        <p14:creationId xmlns:p14="http://schemas.microsoft.com/office/powerpoint/2010/main" val="3183902751"/>
       </p:ext>
     </p:extLst>
   </p:cSld>

</xml_diff>

<commit_message>
docs: updates to context diagram and presentation to reflect tech stack
</commit_message>
<xml_diff>
--- a/project-docs/Sprint-1-Presentation.pptx
+++ b/project-docs/Sprint-1-Presentation.pptx
@@ -3795,8 +3795,12 @@
         <a:lstStyle/>
         <a:p>
           <a:r>
-            <a:rPr lang="en-US"/>
-            <a:t>React.js / React Native / Node.js</a:t>
+            <a:rPr lang="en-US" dirty="0" err="1"/>
+            <a:t>React.js</a:t>
+          </a:r>
+          <a:r>
+            <a:rPr lang="en-US" dirty="0"/>
+            <a:t> / React Native</a:t>
           </a:r>
         </a:p>
       </dgm:t>
@@ -3868,14 +3872,13 @@
         <a:lstStyle/>
         <a:p>
           <a:r>
-            <a:rPr lang="en-US" dirty="0"/>
-            <a:t>Node.js / JavaScript / ASP.NET Core or </a:t>
-          </a:r>
-          <a:r>
             <a:rPr lang="en-US" dirty="0" err="1"/>
             <a:t>Express.js</a:t>
           </a:r>
-          <a:endParaRPr lang="en-US" dirty="0"/>
+          <a:r>
+            <a:rPr lang="en-US" dirty="0"/>
+            <a:t> / MongoDB or PostgreSQL</a:t>
+          </a:r>
         </a:p>
       </dgm:t>
     </dgm:pt>
@@ -4019,9 +4022,10 @@
         <a:lstStyle/>
         <a:p>
           <a:r>
-            <a:rPr lang="en-US" dirty="0"/>
-            <a:t>OpenCV / PIL</a:t>
+            <a:rPr lang="en-US" dirty="0" err="1"/>
+            <a:t>Keras</a:t>
           </a:r>
+          <a:endParaRPr lang="en-US" dirty="0"/>
         </a:p>
       </dgm:t>
     </dgm:pt>
@@ -4093,8 +4097,13 @@
         <a:p>
           <a:r>
             <a:rPr lang="en-US" dirty="0"/>
-            <a:t>GitHub Actions / Docker / Azure</a:t>
+            <a:t>GitHub Actions / Docker / </a:t>
           </a:r>
+          <a:r>
+            <a:rPr lang="en-US" dirty="0" err="1"/>
+            <a:t>Vercel</a:t>
+          </a:r>
+          <a:endParaRPr lang="en-US" dirty="0"/>
         </a:p>
       </dgm:t>
     </dgm:pt>
@@ -6012,8 +6021,12 @@
             <a:buNone/>
           </a:pPr>
           <a:r>
-            <a:rPr lang="en-US" sz="1800" kern="1200"/>
-            <a:t>React.js / React Native / Node.js</a:t>
+            <a:rPr lang="en-US" sz="1800" kern="1200" dirty="0" err="1"/>
+            <a:t>React.js</a:t>
+          </a:r>
+          <a:r>
+            <a:rPr lang="en-US" sz="1800" kern="1200" dirty="0"/>
+            <a:t> / React Native</a:t>
           </a:r>
         </a:p>
       </dsp:txBody>
@@ -6224,14 +6237,13 @@
             <a:buNone/>
           </a:pPr>
           <a:r>
-            <a:rPr lang="en-US" sz="1800" kern="1200" dirty="0"/>
-            <a:t>Node.js / JavaScript / ASP.NET Core or </a:t>
-          </a:r>
-          <a:r>
             <a:rPr lang="en-US" sz="1800" kern="1200" dirty="0" err="1"/>
             <a:t>Express.js</a:t>
           </a:r>
-          <a:endParaRPr lang="en-US" sz="1800" kern="1200" dirty="0"/>
+          <a:r>
+            <a:rPr lang="en-US" sz="1800" kern="1200" dirty="0"/>
+            <a:t> / MongoDB or PostgreSQL</a:t>
+          </a:r>
         </a:p>
       </dsp:txBody>
       <dsp:txXfrm>
@@ -6651,9 +6663,10 @@
             <a:buNone/>
           </a:pPr>
           <a:r>
-            <a:rPr lang="en-US" sz="1800" kern="1200" dirty="0"/>
-            <a:t>OpenCV / PIL</a:t>
+            <a:rPr lang="en-US" sz="1800" kern="1200" dirty="0" err="1"/>
+            <a:t>Keras</a:t>
           </a:r>
+          <a:endParaRPr lang="en-US" sz="1800" kern="1200" dirty="0"/>
         </a:p>
       </dsp:txBody>
       <dsp:txXfrm>
@@ -6864,8 +6877,13 @@
           </a:pPr>
           <a:r>
             <a:rPr lang="en-US" sz="1800" kern="1200" dirty="0"/>
-            <a:t>GitHub Actions / Docker / Azure</a:t>
+            <a:t>GitHub Actions / Docker / </a:t>
           </a:r>
+          <a:r>
+            <a:rPr lang="en-US" sz="1800" kern="1200" dirty="0" err="1"/>
+            <a:t>Vercel</a:t>
+          </a:r>
+          <a:endParaRPr lang="en-US" sz="1800" kern="1200" dirty="0"/>
         </a:p>
       </dsp:txBody>
       <dsp:txXfrm>
@@ -10930,7 +10948,7 @@
           <a:p>
             <a:fld id="{4EC743F4-8769-40B4-85DF-6CB8DE9F66AA}" type="datetimeFigureOut">
               <a:rPr lang="en-US" smtClean="0"/>
-              <a:t>1/31/25</a:t>
+              <a:t>2/1/25</a:t>
             </a:fld>
             <a:endParaRPr lang="en-US"/>
           </a:p>
@@ -11473,7 +11491,7 @@
           <a:p>
             <a:fld id="{4EC743F4-8769-40B4-85DF-6CB8DE9F66AA}" type="datetimeFigureOut">
               <a:rPr lang="en-US" smtClean="0"/>
-              <a:t>1/31/25</a:t>
+              <a:t>2/1/25</a:t>
             </a:fld>
             <a:endParaRPr lang="en-US"/>
           </a:p>
@@ -11681,7 +11699,7 @@
           <a:p>
             <a:fld id="{4EC743F4-8769-40B4-85DF-6CB8DE9F66AA}" type="datetimeFigureOut">
               <a:rPr lang="en-US" smtClean="0"/>
-              <a:t>1/31/25</a:t>
+              <a:t>2/1/25</a:t>
             </a:fld>
             <a:endParaRPr lang="en-US"/>
           </a:p>
@@ -11880,7 +11898,7 @@
           <a:p>
             <a:fld id="{4EC743F4-8769-40B4-85DF-6CB8DE9F66AA}" type="datetimeFigureOut">
               <a:rPr lang="en-US" smtClean="0"/>
-              <a:t>1/31/25</a:t>
+              <a:t>2/1/25</a:t>
             </a:fld>
             <a:endParaRPr lang="en-US"/>
           </a:p>
@@ -12163,7 +12181,7 @@
           <a:p>
             <a:fld id="{4EC743F4-8769-40B4-85DF-6CB8DE9F66AA}" type="datetimeFigureOut">
               <a:rPr lang="en-US" smtClean="0"/>
-              <a:t>1/31/25</a:t>
+              <a:t>2/1/25</a:t>
             </a:fld>
             <a:endParaRPr lang="en-US" dirty="0"/>
           </a:p>
@@ -13114,7 +13132,7 @@
           <a:p>
             <a:fld id="{4EC743F4-8769-40B4-85DF-6CB8DE9F66AA}" type="datetimeFigureOut">
               <a:rPr lang="en-US" smtClean="0"/>
-              <a:t>1/31/25</a:t>
+              <a:t>2/1/25</a:t>
             </a:fld>
             <a:endParaRPr lang="en-US"/>
           </a:p>
@@ -13533,7 +13551,7 @@
           <a:p>
             <a:fld id="{4EC743F4-8769-40B4-85DF-6CB8DE9F66AA}" type="datetimeFigureOut">
               <a:rPr lang="en-US" smtClean="0"/>
-              <a:t>1/31/25</a:t>
+              <a:t>2/1/25</a:t>
             </a:fld>
             <a:endParaRPr lang="en-US"/>
           </a:p>
@@ -13674,7 +13692,7 @@
           <a:p>
             <a:fld id="{4EC743F4-8769-40B4-85DF-6CB8DE9F66AA}" type="datetimeFigureOut">
               <a:rPr lang="en-US" smtClean="0"/>
-              <a:t>1/31/25</a:t>
+              <a:t>2/1/25</a:t>
             </a:fld>
             <a:endParaRPr lang="en-US"/>
           </a:p>
@@ -13787,7 +13805,7 @@
           <a:p>
             <a:fld id="{4EC743F4-8769-40B4-85DF-6CB8DE9F66AA}" type="datetimeFigureOut">
               <a:rPr lang="en-US" smtClean="0"/>
-              <a:t>1/31/25</a:t>
+              <a:t>2/1/25</a:t>
             </a:fld>
             <a:endParaRPr lang="en-US"/>
           </a:p>
@@ -14104,7 +14122,7 @@
           <a:p>
             <a:fld id="{4EC743F4-8769-40B4-85DF-6CB8DE9F66AA}" type="datetimeFigureOut">
               <a:rPr lang="en-US" smtClean="0"/>
-              <a:t>1/31/25</a:t>
+              <a:t>2/1/25</a:t>
             </a:fld>
             <a:endParaRPr lang="en-US"/>
           </a:p>
@@ -14449,7 +14467,7 @@
           <a:p>
             <a:fld id="{4EC743F4-8769-40B4-85DF-6CB8DE9F66AA}" type="datetimeFigureOut">
               <a:rPr lang="en-US" smtClean="0"/>
-              <a:t>1/31/25</a:t>
+              <a:t>2/1/25</a:t>
             </a:fld>
             <a:endParaRPr lang="en-US"/>
           </a:p>
@@ -14744,7 +14762,7 @@
             <a:fld id="{4EC743F4-8769-40B4-85DF-6CB8DE9F66AA}" type="datetimeFigureOut">
               <a:rPr lang="en-US" smtClean="0"/>
               <a:pPr/>
-              <a:t>1/31/25</a:t>
+              <a:t>2/1/25</a:t>
             </a:fld>
             <a:endParaRPr lang="en-US" dirty="0"/>
           </a:p>
@@ -17315,7 +17333,7 @@
             <p:ph idx="1"/>
             <p:extLst>
               <p:ext uri="{D42A27DB-BD31-4B8C-83A1-F6EECF244321}">
-                <p14:modId xmlns:p14="http://schemas.microsoft.com/office/powerpoint/2010/main" val="2336954711"/>
+                <p14:modId xmlns:p14="http://schemas.microsoft.com/office/powerpoint/2010/main" val="2048922641"/>
               </p:ext>
             </p:extLst>
           </p:nvPr>
@@ -17386,7 +17404,7 @@
         </p:nvSpPr>
         <p:spPr>
           <a:xfrm>
-            <a:off x="989400" y="395289"/>
+            <a:off x="989400" y="195264"/>
             <a:ext cx="10213200" cy="633411"/>
           </a:xfrm>
         </p:spPr>
@@ -17409,19 +17427,17 @@
       </p:sp>
       <p:pic>
         <p:nvPicPr>
-          <p:cNvPr id="5" name="Content Placeholder 4" descr="A diagram of a software application&#10;&#10;Description automatically generated">
+          <p:cNvPr id="13" name="Picture 12" descr="A diagram of a software application&#10;&#10;Description automatically generated">
             <a:extLst>
               <a:ext uri="{FF2B5EF4-FFF2-40B4-BE49-F238E27FC236}">
-                <a16:creationId xmlns:a16="http://schemas.microsoft.com/office/drawing/2014/main" id="{83C735F0-A4D6-229E-2A29-1E307DD2A586}"/>
+                <a16:creationId xmlns:a16="http://schemas.microsoft.com/office/drawing/2014/main" id="{63E67D3C-129B-4A35-E427-5D36E2AE4138}"/>
               </a:ext>
             </a:extLst>
           </p:cNvPr>
           <p:cNvPicPr>
-            <a:picLocks noGrp="1" noChangeAspect="1"/>
+            <a:picLocks noChangeAspect="1"/>
           </p:cNvPicPr>
-          <p:nvPr>
-            <p:ph idx="1"/>
-          </p:nvPr>
+          <p:nvPr/>
         </p:nvPicPr>
         <p:blipFill>
           <a:blip r:embed="rId2"/>
@@ -17431,9 +17447,12 @@
         </p:blipFill>
         <p:spPr>
           <a:xfrm>
-            <a:off x="1233478" y="1145005"/>
-            <a:ext cx="9725043" cy="5317706"/>
+            <a:off x="989400" y="899761"/>
+            <a:ext cx="10213201" cy="5620688"/>
           </a:xfrm>
+          <a:prstGeom prst="rect">
+            <a:avLst/>
+          </a:prstGeom>
         </p:spPr>
       </p:pic>
     </p:spTree>

</xml_diff>

<commit_message>
docs: edits to sprint 1 presentation
</commit_message>
<xml_diff>
--- a/project-docs/Sprint-1-Presentation.pptx
+++ b/project-docs/Sprint-1-Presentation.pptx
@@ -2632,7 +2632,7 @@
           </a:r>
           <a:r>
             <a:rPr lang="en-US" sz="1600" b="0" i="0" baseline="0" dirty="0"/>
-            <a:t> I am a user who wishes to use an image to detect skin cancer so that I receive information about my condition</a:t>
+            <a:t> I am a user who wishes to upload an image to detect skin cancer so that I receive information about my condition</a:t>
           </a:r>
           <a:endParaRPr lang="en-US" sz="1600" i="0" dirty="0"/>
         </a:p>
@@ -2669,11 +2669,11 @@
         <a:p>
           <a:r>
             <a:rPr lang="en-US" sz="1600" b="1" i="0" baseline="0" dirty="0"/>
-            <a:t>Epic 2</a:t>
+            <a:t>Epic 2 </a:t>
           </a:r>
           <a:r>
             <a:rPr lang="en-US" sz="1600" b="0" i="0" baseline="0" dirty="0"/>
-            <a:t> TBD</a:t>
+            <a:t>I am a user who wishes to use their mobile device to take a photo of skin for skin cancer detection</a:t>
           </a:r>
           <a:endParaRPr lang="en-US" sz="1600" i="0" dirty="0"/>
         </a:p>
@@ -3071,7 +3071,7 @@
           </a:r>
           <a:r>
             <a:rPr lang="en-US" b="0" dirty="0"/>
-            <a:t> Determine the required input size for your ML model</a:t>
+            <a:t> Determine the required input size for your ML model (2)</a:t>
           </a:r>
         </a:p>
       </dgm:t>
@@ -3114,7 +3114,7 @@
           </a:r>
           <a:r>
             <a:rPr lang="en-US" b="0" dirty="0"/>
-            <a:t>Identify datasets from where we can fetch the images for training the ML model</a:t>
+            <a:t>Identify datasets from where we can fetch the images for training the ML model (2)</a:t>
           </a:r>
           <a:r>
             <a:rPr lang="en-US" dirty="0"/>
@@ -3161,7 +3161,7 @@
           </a:r>
           <a:r>
             <a:rPr lang="en-US" b="0" dirty="0"/>
-            <a:t>Convert images to the required color space</a:t>
+            <a:t>Convert images to the required color space (1)</a:t>
           </a:r>
         </a:p>
         <a:p>
@@ -3174,7 +3174,7 @@
           </a:r>
           <a:r>
             <a:rPr lang="en-US" b="0" dirty="0"/>
-            <a:t>Implement an image augmentation pipeline to improve model generalization.</a:t>
+            <a:t>Implement an image augmentation pipeline to improve model generalization (3)</a:t>
           </a:r>
         </a:p>
         <a:p>
@@ -3187,7 +3187,7 @@
           </a:r>
           <a:r>
             <a:rPr lang="en-US" b="0" dirty="0"/>
-            <a:t>Use a CNN to classify the skin cancer type</a:t>
+            <a:t>Use a CNN to classify the skin cancer type (1)</a:t>
           </a:r>
         </a:p>
         <a:p>
@@ -3200,7 +3200,7 @@
           </a:r>
           <a:r>
             <a:rPr lang="en-US" b="0" dirty="0"/>
-            <a:t>Establish a repeatable pipeline for training and exporting the ML model.</a:t>
+            <a:t>Establish a repeatable pipeline for training the ML model (3)</a:t>
           </a:r>
         </a:p>
         <a:p>
@@ -3213,8 +3213,35 @@
           </a:r>
           <a:r>
             <a:rPr lang="en-US" b="0" dirty="0"/>
-            <a:t>Test the ML model for accuracy and reliability.</a:t>
+            <a:t>Test the ML model for accuracy and reliability (3)</a:t>
           </a:r>
+        </a:p>
+        <a:p>
+          <a:pPr>
+            <a:buNone/>
+          </a:pPr>
+          <a:r>
+            <a:rPr lang="en-US" b="1" dirty="0"/>
+            <a:t>Item 8 </a:t>
+          </a:r>
+          <a:r>
+            <a:rPr lang="en-US" b="0" dirty="0"/>
+            <a:t>Validate the ML end-to-end workflow - image upload --&gt; analysis --&gt; results (1)</a:t>
+          </a:r>
+        </a:p>
+        <a:p>
+          <a:pPr>
+            <a:buNone/>
+          </a:pPr>
+          <a:r>
+            <a:rPr lang="en-US" b="1" dirty="0"/>
+            <a:t>Item 9 </a:t>
+          </a:r>
+          <a:r>
+            <a:rPr lang="en-US" b="0" dirty="0"/>
+            <a:t>Backend API / Event Processor initialized and pingable (2)</a:t>
+          </a:r>
+          <a:endParaRPr lang="en-US" b="1" dirty="0"/>
         </a:p>
       </dgm:t>
     </dgm:pt>
@@ -3680,7 +3707,7 @@
       <dgm:spPr/>
     </dgm:pt>
     <dgm:pt modelId="{A1C3C12C-0B10-C644-828C-59F92E65C5BF}" type="pres">
-      <dgm:prSet presAssocID="{71EE360D-1390-41E2-91DE-B360117B76EF}" presName="descendantArrow" presStyleLbl="bgAccFollowNode1" presStyleIdx="2" presStyleCnt="3" custScaleY="172328"/>
+      <dgm:prSet presAssocID="{71EE360D-1390-41E2-91DE-B360117B76EF}" presName="descendantArrow" presStyleLbl="bgAccFollowNode1" presStyleIdx="2" presStyleCnt="3" custScaleY="202170"/>
       <dgm:spPr/>
     </dgm:pt>
   </dgm:ptLst>
@@ -3912,10 +3939,10 @@
         <a:lstStyle/>
         <a:p>
           <a:r>
-            <a:rPr lang="en-US" b="1"/>
+            <a:rPr lang="en-US" b="1" dirty="0"/>
             <a:t>ML </a:t>
           </a:r>
-          <a:endParaRPr lang="en-US"/>
+          <a:endParaRPr lang="en-US" dirty="0"/>
         </a:p>
       </dgm:t>
     </dgm:pt>
@@ -3931,42 +3958,6 @@
       </dgm:t>
     </dgm:pt>
     <dgm:pt modelId="{04EEC7AC-4951-482A-B71D-B836F2E39B56}" type="sibTrans" cxnId="{2A07DC02-FDFC-442F-BF30-8BB2CB11EC80}">
-      <dgm:prSet/>
-      <dgm:spPr/>
-      <dgm:t>
-        <a:bodyPr/>
-        <a:lstStyle/>
-        <a:p>
-          <a:endParaRPr lang="en-US"/>
-        </a:p>
-      </dgm:t>
-    </dgm:pt>
-    <dgm:pt modelId="{F990BFB4-C503-4D0E-911B-9524A1E49BF1}">
-      <dgm:prSet/>
-      <dgm:spPr/>
-      <dgm:t>
-        <a:bodyPr/>
-        <a:lstStyle/>
-        <a:p>
-          <a:r>
-            <a:rPr lang="en-US"/>
-            <a:t>TensorFlow</a:t>
-          </a:r>
-        </a:p>
-      </dgm:t>
-    </dgm:pt>
-    <dgm:pt modelId="{4D7BD19A-CC6A-49D4-84C9-FC70FB0A7D84}" type="parTrans" cxnId="{8A4E811E-2DBE-41FB-85CC-B826BD0317CF}">
-      <dgm:prSet/>
-      <dgm:spPr/>
-      <dgm:t>
-        <a:bodyPr/>
-        <a:lstStyle/>
-        <a:p>
-          <a:endParaRPr lang="en-US"/>
-        </a:p>
-      </dgm:t>
-    </dgm:pt>
-    <dgm:pt modelId="{F6D2B92E-B5E8-46EE-B34E-EE9D59EEE73C}" type="sibTrans" cxnId="{8A4E811E-2DBE-41FB-85CC-B826BD0317CF}">
       <dgm:prSet/>
       <dgm:spPr/>
       <dgm:t>
@@ -4119,6 +4110,42 @@
       </dgm:t>
     </dgm:pt>
     <dgm:pt modelId="{59B0C634-9886-4A68-9A63-9E807BE9C844}" type="sibTrans" cxnId="{FB859A87-7094-4CD0-B330-B5A8D92739B2}">
+      <dgm:prSet/>
+      <dgm:spPr/>
+      <dgm:t>
+        <a:bodyPr/>
+        <a:lstStyle/>
+        <a:p>
+          <a:endParaRPr lang="en-US"/>
+        </a:p>
+      </dgm:t>
+    </dgm:pt>
+    <dgm:pt modelId="{F990BFB4-C503-4D0E-911B-9524A1E49BF1}">
+      <dgm:prSet/>
+      <dgm:spPr/>
+      <dgm:t>
+        <a:bodyPr/>
+        <a:lstStyle/>
+        <a:p>
+          <a:r>
+            <a:rPr lang="en-US" dirty="0"/>
+            <a:t>TensorFlow / Python</a:t>
+          </a:r>
+        </a:p>
+      </dgm:t>
+    </dgm:pt>
+    <dgm:pt modelId="{F6D2B92E-B5E8-46EE-B34E-EE9D59EEE73C}" type="sibTrans" cxnId="{8A4E811E-2DBE-41FB-85CC-B826BD0317CF}">
+      <dgm:prSet/>
+      <dgm:spPr/>
+      <dgm:t>
+        <a:bodyPr/>
+        <a:lstStyle/>
+        <a:p>
+          <a:endParaRPr lang="en-US"/>
+        </a:p>
+      </dgm:t>
+    </dgm:pt>
+    <dgm:pt modelId="{4D7BD19A-CC6A-49D4-84C9-FC70FB0A7D84}" type="parTrans" cxnId="{8A4E811E-2DBE-41FB-85CC-B826BD0317CF}">
       <dgm:prSet/>
       <dgm:spPr/>
       <dgm:t>
@@ -4577,7 +4604,7 @@
           </a:r>
           <a:r>
             <a:rPr lang="en-US" sz="1600" b="0" i="0" kern="1200" baseline="0" dirty="0"/>
-            <a:t> I am a user who wishes to use an image to detect skin cancer so that I receive information about my condition</a:t>
+            <a:t> I am a user who wishes to upload an image to detect skin cancer so that I receive information about my condition</a:t>
           </a:r>
           <a:endParaRPr lang="en-US" sz="1600" i="0" kern="1200" dirty="0"/>
         </a:p>
@@ -4596,11 +4623,11 @@
           </a:pPr>
           <a:r>
             <a:rPr lang="en-US" sz="1600" b="1" i="0" kern="1200" baseline="0" dirty="0"/>
-            <a:t>Epic 2</a:t>
+            <a:t>Epic 2 </a:t>
           </a:r>
           <a:r>
             <a:rPr lang="en-US" sz="1600" b="0" i="0" kern="1200" baseline="0" dirty="0"/>
-            <a:t> TBD</a:t>
+            <a:t>I am a user who wishes to use their mobile device to take a photo of skin for skin cancer detection</a:t>
           </a:r>
           <a:endParaRPr lang="en-US" sz="1600" i="0" kern="1200" dirty="0"/>
         </a:p>
@@ -4957,8 +4984,8 @@
       </dsp:nvSpPr>
       <dsp:spPr>
         <a:xfrm>
-          <a:off x="0" y="4232876"/>
-          <a:ext cx="2857500" cy="1315451"/>
+          <a:off x="0" y="4267323"/>
+          <a:ext cx="2857500" cy="1282381"/>
         </a:xfrm>
         <a:prstGeom prst="rect">
           <a:avLst/>
@@ -5024,8 +5051,8 @@
         </a:p>
       </dsp:txBody>
       <dsp:txXfrm>
-        <a:off x="0" y="4232876"/>
-        <a:ext cx="2857500" cy="1315451"/>
+        <a:off x="0" y="4267323"/>
+        <a:ext cx="2857500" cy="1282381"/>
       </dsp:txXfrm>
     </dsp:sp>
     <dsp:sp modelId="{B658C8BD-DCA0-6C46-9A52-D700D7AD1A25}">
@@ -5035,8 +5062,8 @@
       </dsp:nvSpPr>
       <dsp:spPr>
         <a:xfrm>
-          <a:off x="2857500" y="4210731"/>
-          <a:ext cx="8572500" cy="1359741"/>
+          <a:off x="2857500" y="4245735"/>
+          <a:ext cx="8572500" cy="1325557"/>
         </a:xfrm>
         <a:prstGeom prst="rect">
           <a:avLst/>
@@ -5200,8 +5227,8 @@
         </a:p>
       </dsp:txBody>
       <dsp:txXfrm>
-        <a:off x="2857500" y="4210731"/>
-        <a:ext cx="8572500" cy="1359741"/>
+        <a:off x="2857500" y="4245735"/>
+        <a:ext cx="8572500" cy="1325557"/>
       </dsp:txXfrm>
     </dsp:sp>
     <dsp:sp modelId="{C4B45F58-9D45-4945-80ED-7F83014174CC}">
@@ -5211,8 +5238,8 @@
       </dsp:nvSpPr>
       <dsp:spPr>
         <a:xfrm rot="10800000">
-          <a:off x="0" y="2165744"/>
-          <a:ext cx="2857500" cy="2059597"/>
+          <a:off x="0" y="2252158"/>
+          <a:ext cx="2857500" cy="2007820"/>
         </a:xfrm>
         <a:prstGeom prst="upArrowCallout">
           <a:avLst>
@@ -5283,8 +5310,8 @@
         </a:p>
       </dsp:txBody>
       <dsp:txXfrm rot="-10800000">
-        <a:off x="0" y="2165744"/>
-        <a:ext cx="2857500" cy="1338738"/>
+        <a:off x="0" y="2252158"/>
+        <a:ext cx="2857500" cy="1305083"/>
       </dsp:txXfrm>
     </dsp:sp>
     <dsp:sp modelId="{3BEE0999-FA5F-B644-858A-E7D7CC533D11}">
@@ -5294,8 +5321,8 @@
       </dsp:nvSpPr>
       <dsp:spPr>
         <a:xfrm>
-          <a:off x="2857500" y="2169857"/>
-          <a:ext cx="8572500" cy="1527050"/>
+          <a:off x="2857500" y="2256167"/>
+          <a:ext cx="8572500" cy="1488660"/>
         </a:xfrm>
         <a:prstGeom prst="rect">
           <a:avLst/>
@@ -5500,8 +5527,8 @@
         </a:p>
       </dsp:txBody>
       <dsp:txXfrm>
-        <a:off x="2857500" y="2169857"/>
-        <a:ext cx="8572500" cy="1527050"/>
+        <a:off x="2857500" y="2256167"/>
+        <a:ext cx="8572500" cy="1488660"/>
       </dsp:txXfrm>
     </dsp:sp>
     <dsp:sp modelId="{EC82E5FF-5B23-3E44-AAEF-D20DB3E0BCC4}">
@@ -5511,8 +5538,8 @@
       </dsp:nvSpPr>
       <dsp:spPr>
         <a:xfrm rot="10800000">
-          <a:off x="0" y="25300"/>
-          <a:ext cx="2857500" cy="2155054"/>
+          <a:off x="0" y="165524"/>
+          <a:ext cx="2857500" cy="2100877"/>
         </a:xfrm>
         <a:prstGeom prst="upArrowCallout">
           <a:avLst>
@@ -5583,8 +5610,8 @@
         </a:p>
       </dsp:txBody>
       <dsp:txXfrm rot="-10800000">
-        <a:off x="0" y="25300"/>
-        <a:ext cx="2857500" cy="1400785"/>
+        <a:off x="0" y="165524"/>
+        <a:ext cx="2857500" cy="1365570"/>
       </dsp:txXfrm>
     </dsp:sp>
     <dsp:sp modelId="{A1C3C12C-0B10-C644-828C-59F92E65C5BF}">
@@ -5594,8 +5621,8 @@
       </dsp:nvSpPr>
       <dsp:spPr>
         <a:xfrm>
-          <a:off x="2857500" y="1652"/>
-          <a:ext cx="8572500" cy="1678029"/>
+          <a:off x="2857500" y="831"/>
+          <a:ext cx="8572500" cy="1919122"/>
         </a:xfrm>
         <a:prstGeom prst="rect">
           <a:avLst/>
@@ -5662,7 +5689,7 @@
           </a:r>
           <a:r>
             <a:rPr lang="en-US" sz="1100" b="0" kern="1200" dirty="0"/>
-            <a:t> Determine the required input size for your ML model</a:t>
+            <a:t> Determine the required input size for your ML model (2)</a:t>
           </a:r>
         </a:p>
         <a:p>
@@ -5684,7 +5711,7 @@
           </a:r>
           <a:r>
             <a:rPr lang="en-US" sz="1100" b="0" kern="1200" dirty="0"/>
-            <a:t>Identify datasets from where we can fetch the images for training the ML model</a:t>
+            <a:t>Identify datasets from where we can fetch the images for training the ML model (2)</a:t>
           </a:r>
           <a:r>
             <a:rPr lang="en-US" sz="1100" kern="1200" dirty="0"/>
@@ -5710,7 +5737,7 @@
           </a:r>
           <a:r>
             <a:rPr lang="en-US" sz="1100" b="0" kern="1200" dirty="0"/>
-            <a:t>Convert images to the required color space</a:t>
+            <a:t>Convert images to the required color space (1)</a:t>
           </a:r>
         </a:p>
         <a:p>
@@ -5732,7 +5759,7 @@
           </a:r>
           <a:r>
             <a:rPr lang="en-US" sz="1100" b="0" kern="1200" dirty="0"/>
-            <a:t>Implement an image augmentation pipeline to improve model generalization.</a:t>
+            <a:t>Implement an image augmentation pipeline to improve model generalization (3)</a:t>
           </a:r>
         </a:p>
         <a:p>
@@ -5754,7 +5781,7 @@
           </a:r>
           <a:r>
             <a:rPr lang="en-US" sz="1100" b="0" kern="1200" dirty="0"/>
-            <a:t>Use a CNN to classify the skin cancer type</a:t>
+            <a:t>Use a CNN to classify the skin cancer type (1)</a:t>
           </a:r>
         </a:p>
         <a:p>
@@ -5776,7 +5803,7 @@
           </a:r>
           <a:r>
             <a:rPr lang="en-US" sz="1100" b="0" kern="1200" dirty="0"/>
-            <a:t>Establish a repeatable pipeline for training and exporting the ML model.</a:t>
+            <a:t>Establish a repeatable pipeline for training the ML model (3)</a:t>
           </a:r>
         </a:p>
         <a:p>
@@ -5798,13 +5825,58 @@
           </a:r>
           <a:r>
             <a:rPr lang="en-US" sz="1100" b="0" kern="1200" dirty="0"/>
-            <a:t>Test the ML model for accuracy and reliability.</a:t>
+            <a:t>Test the ML model for accuracy and reliability (3)</a:t>
           </a:r>
+        </a:p>
+        <a:p>
+          <a:pPr marL="0" lvl="0" indent="0" algn="l" defTabSz="488950">
+            <a:lnSpc>
+              <a:spcPct val="90000"/>
+            </a:lnSpc>
+            <a:spcBef>
+              <a:spcPct val="0"/>
+            </a:spcBef>
+            <a:spcAft>
+              <a:spcPct val="35000"/>
+            </a:spcAft>
+            <a:buNone/>
+          </a:pPr>
+          <a:r>
+            <a:rPr lang="en-US" sz="1100" b="1" kern="1200" dirty="0"/>
+            <a:t>Item 8 </a:t>
+          </a:r>
+          <a:r>
+            <a:rPr lang="en-US" sz="1100" b="0" kern="1200" dirty="0"/>
+            <a:t>Validate the ML end-to-end workflow - image upload --&gt; analysis --&gt; results (1)</a:t>
+          </a:r>
+        </a:p>
+        <a:p>
+          <a:pPr marL="0" lvl="0" indent="0" algn="l" defTabSz="488950">
+            <a:lnSpc>
+              <a:spcPct val="90000"/>
+            </a:lnSpc>
+            <a:spcBef>
+              <a:spcPct val="0"/>
+            </a:spcBef>
+            <a:spcAft>
+              <a:spcPct val="35000"/>
+            </a:spcAft>
+            <a:buNone/>
+          </a:pPr>
+          <a:r>
+            <a:rPr lang="en-US" sz="1100" b="1" kern="1200" dirty="0"/>
+            <a:t>Item 9 </a:t>
+          </a:r>
+          <a:r>
+            <a:rPr lang="en-US" sz="1100" b="0" kern="1200" dirty="0"/>
+            <a:t>Backend API / Event Processor initialized and pingable (2)</a:t>
+          </a:r>
+          <a:endParaRPr lang="en-US" sz="1100" b="1" kern="1200" dirty="0"/>
         </a:p>
       </dsp:txBody>
       <dsp:txXfrm>
-        <a:off x="2857500" y="1652"/>
-        <a:ext cx="8572500" cy="1678029"/>
+        <a:off x="2857500" y="831"/>
+        <a:ext cx="8572500" cy="1919122"/>
       </dsp:txXfrm>
     </dsp:sp>
   </dsp:spTree>
@@ -6390,10 +6462,10 @@
             <a:buNone/>
           </a:pPr>
           <a:r>
-            <a:rPr lang="en-US" sz="1900" b="1" kern="1200"/>
+            <a:rPr lang="en-US" sz="1900" b="1" kern="1200" dirty="0"/>
             <a:t>ML </a:t>
           </a:r>
-          <a:endParaRPr lang="en-US" sz="1900" kern="1200"/>
+          <a:endParaRPr lang="en-US" sz="1900" kern="1200" dirty="0"/>
         </a:p>
       </dsp:txBody>
       <dsp:txXfrm>
@@ -6451,8 +6523,8 @@
             <a:buNone/>
           </a:pPr>
           <a:r>
-            <a:rPr lang="en-US" sz="1800" kern="1200"/>
-            <a:t>TensorFlow</a:t>
+            <a:rPr lang="en-US" sz="1800" kern="1200" dirty="0"/>
+            <a:t>TensorFlow / Python</a:t>
           </a:r>
         </a:p>
       </dsp:txBody>
@@ -10948,7 +11020,7 @@
           <a:p>
             <a:fld id="{4EC743F4-8769-40B4-85DF-6CB8DE9F66AA}" type="datetimeFigureOut">
               <a:rPr lang="en-US" smtClean="0"/>
-              <a:t>2/1/25</a:t>
+              <a:t>2/3/25</a:t>
             </a:fld>
             <a:endParaRPr lang="en-US"/>
           </a:p>
@@ -11491,7 +11563,7 @@
           <a:p>
             <a:fld id="{4EC743F4-8769-40B4-85DF-6CB8DE9F66AA}" type="datetimeFigureOut">
               <a:rPr lang="en-US" smtClean="0"/>
-              <a:t>2/1/25</a:t>
+              <a:t>2/3/25</a:t>
             </a:fld>
             <a:endParaRPr lang="en-US"/>
           </a:p>
@@ -11699,7 +11771,7 @@
           <a:p>
             <a:fld id="{4EC743F4-8769-40B4-85DF-6CB8DE9F66AA}" type="datetimeFigureOut">
               <a:rPr lang="en-US" smtClean="0"/>
-              <a:t>2/1/25</a:t>
+              <a:t>2/3/25</a:t>
             </a:fld>
             <a:endParaRPr lang="en-US"/>
           </a:p>
@@ -11898,7 +11970,7 @@
           <a:p>
             <a:fld id="{4EC743F4-8769-40B4-85DF-6CB8DE9F66AA}" type="datetimeFigureOut">
               <a:rPr lang="en-US" smtClean="0"/>
-              <a:t>2/1/25</a:t>
+              <a:t>2/3/25</a:t>
             </a:fld>
             <a:endParaRPr lang="en-US"/>
           </a:p>
@@ -12181,7 +12253,7 @@
           <a:p>
             <a:fld id="{4EC743F4-8769-40B4-85DF-6CB8DE9F66AA}" type="datetimeFigureOut">
               <a:rPr lang="en-US" smtClean="0"/>
-              <a:t>2/1/25</a:t>
+              <a:t>2/3/25</a:t>
             </a:fld>
             <a:endParaRPr lang="en-US" dirty="0"/>
           </a:p>
@@ -13132,7 +13204,7 @@
           <a:p>
             <a:fld id="{4EC743F4-8769-40B4-85DF-6CB8DE9F66AA}" type="datetimeFigureOut">
               <a:rPr lang="en-US" smtClean="0"/>
-              <a:t>2/1/25</a:t>
+              <a:t>2/3/25</a:t>
             </a:fld>
             <a:endParaRPr lang="en-US"/>
           </a:p>
@@ -13551,7 +13623,7 @@
           <a:p>
             <a:fld id="{4EC743F4-8769-40B4-85DF-6CB8DE9F66AA}" type="datetimeFigureOut">
               <a:rPr lang="en-US" smtClean="0"/>
-              <a:t>2/1/25</a:t>
+              <a:t>2/3/25</a:t>
             </a:fld>
             <a:endParaRPr lang="en-US"/>
           </a:p>
@@ -13692,7 +13764,7 @@
           <a:p>
             <a:fld id="{4EC743F4-8769-40B4-85DF-6CB8DE9F66AA}" type="datetimeFigureOut">
               <a:rPr lang="en-US" smtClean="0"/>
-              <a:t>2/1/25</a:t>
+              <a:t>2/3/25</a:t>
             </a:fld>
             <a:endParaRPr lang="en-US"/>
           </a:p>
@@ -13805,7 +13877,7 @@
           <a:p>
             <a:fld id="{4EC743F4-8769-40B4-85DF-6CB8DE9F66AA}" type="datetimeFigureOut">
               <a:rPr lang="en-US" smtClean="0"/>
-              <a:t>2/1/25</a:t>
+              <a:t>2/3/25</a:t>
             </a:fld>
             <a:endParaRPr lang="en-US"/>
           </a:p>
@@ -14122,7 +14194,7 @@
           <a:p>
             <a:fld id="{4EC743F4-8769-40B4-85DF-6CB8DE9F66AA}" type="datetimeFigureOut">
               <a:rPr lang="en-US" smtClean="0"/>
-              <a:t>2/1/25</a:t>
+              <a:t>2/3/25</a:t>
             </a:fld>
             <a:endParaRPr lang="en-US"/>
           </a:p>
@@ -14467,7 +14539,7 @@
           <a:p>
             <a:fld id="{4EC743F4-8769-40B4-85DF-6CB8DE9F66AA}" type="datetimeFigureOut">
               <a:rPr lang="en-US" smtClean="0"/>
-              <a:t>2/1/25</a:t>
+              <a:t>2/3/25</a:t>
             </a:fld>
             <a:endParaRPr lang="en-US"/>
           </a:p>
@@ -14762,7 +14834,7 @@
             <a:fld id="{4EC743F4-8769-40B4-85DF-6CB8DE9F66AA}" type="datetimeFigureOut">
               <a:rPr lang="en-US" smtClean="0"/>
               <a:pPr/>
-              <a:t>2/1/25</a:t>
+              <a:t>2/3/25</a:t>
             </a:fld>
             <a:endParaRPr lang="en-US" dirty="0"/>
           </a:p>
@@ -16729,7 +16801,7 @@
             <p:ph idx="1"/>
             <p:extLst>
               <p:ext uri="{D42A27DB-BD31-4B8C-83A1-F6EECF244321}">
-                <p14:modId xmlns:p14="http://schemas.microsoft.com/office/powerpoint/2010/main" val="1876485312"/>
+                <p14:modId xmlns:p14="http://schemas.microsoft.com/office/powerpoint/2010/main" val="1484837530"/>
               </p:ext>
             </p:extLst>
           </p:nvPr>
@@ -16894,7 +16966,7 @@
                 </a:solidFill>
                 <a:latin typeface="+mn-lt"/>
               </a:rPr>
-              <a:t>Release Plan:</a:t>
+              <a:t>Release Plan: Estimated Velocity = 20</a:t>
             </a:r>
           </a:p>
         </p:txBody>
@@ -16967,7 +17039,7 @@
             <p:ph idx="1"/>
             <p:extLst>
               <p:ext uri="{D42A27DB-BD31-4B8C-83A1-F6EECF244321}">
-                <p14:modId xmlns:p14="http://schemas.microsoft.com/office/powerpoint/2010/main" val="2632690453"/>
+                <p14:modId xmlns:p14="http://schemas.microsoft.com/office/powerpoint/2010/main" val="718931220"/>
               </p:ext>
             </p:extLst>
           </p:nvPr>
@@ -17093,7 +17165,7 @@
                   </a:schemeClr>
                 </a:solidFill>
               </a:rPr>
-              <a:t>Test and optimize backend API response time to ensure real-time diagnosis feedback.</a:t>
+              <a:t>Test and optimize backend API response time to ensure real-time diagnosis feedback</a:t>
             </a:r>
           </a:p>
           <a:p>
@@ -17105,7 +17177,19 @@
                   </a:schemeClr>
                 </a:solidFill>
               </a:rPr>
-              <a:t>Integrate a visualization tool to show model confidence in predictions.</a:t>
+              <a:t>Integrate a visualization tool to show model confidence in predictions</a:t>
+            </a:r>
+          </a:p>
+          <a:p>
+            <a:r>
+              <a:rPr lang="en-US" dirty="0">
+                <a:solidFill>
+                  <a:schemeClr val="bg2">
+                    <a:alpha val="60000"/>
+                  </a:schemeClr>
+                </a:solidFill>
+              </a:rPr>
+              <a:t>Offer a mobile version of the application with React Native development</a:t>
             </a:r>
           </a:p>
         </p:txBody>
@@ -17333,7 +17417,7 @@
             <p:ph idx="1"/>
             <p:extLst>
               <p:ext uri="{D42A27DB-BD31-4B8C-83A1-F6EECF244321}">
-                <p14:modId xmlns:p14="http://schemas.microsoft.com/office/powerpoint/2010/main" val="2048922641"/>
+                <p14:modId xmlns:p14="http://schemas.microsoft.com/office/powerpoint/2010/main" val="3028829438"/>
               </p:ext>
             </p:extLst>
           </p:nvPr>
@@ -17471,6 +17555,14 @@
 <file path=ppt/slides/slide8.xml><?xml version="1.0" encoding="utf-8"?>
 <p:sld xmlns:a="http://schemas.openxmlformats.org/drawingml/2006/main" xmlns:r="http://schemas.openxmlformats.org/officeDocument/2006/relationships" xmlns:p="http://schemas.openxmlformats.org/presentationml/2006/main">
   <p:cSld>
+    <p:bg>
+      <p:bgPr>
+        <a:solidFill>
+          <a:schemeClr val="tx1"/>
+        </a:solidFill>
+        <a:effectLst/>
+      </p:bgPr>
+    </p:bg>
     <p:spTree>
       <p:nvGrpSpPr>
         <p:cNvPr id="1" name=""/>
@@ -17501,13 +17593,22 @@
             <p:ph type="title"/>
           </p:nvPr>
         </p:nvSpPr>
-        <p:spPr/>
+        <p:spPr>
+          <a:xfrm>
+            <a:off x="989400" y="84674"/>
+            <a:ext cx="10213200" cy="650080"/>
+          </a:xfrm>
+        </p:spPr>
         <p:txBody>
           <a:bodyPr anchor="t"/>
           <a:lstStyle/>
           <a:p>
+            <a:pPr algn="ctr"/>
             <a:r>
               <a:rPr lang="en-US" dirty="0">
+                <a:solidFill>
+                  <a:schemeClr val="bg2"/>
+                </a:solidFill>
                 <a:latin typeface="+mn-lt"/>
               </a:rPr>
               <a:t>Sprint Retrospective	</a:t>
@@ -17515,34 +17616,36 @@
           </a:p>
         </p:txBody>
       </p:sp>
-      <p:sp>
-        <p:nvSpPr>
-          <p:cNvPr id="3" name="Content Placeholder 2">
+      <p:pic>
+        <p:nvPicPr>
+          <p:cNvPr id="6" name="Picture 5" descr="A screenshot of a computer&#10;&#10;Description automatically generated">
             <a:extLst>
               <a:ext uri="{FF2B5EF4-FFF2-40B4-BE49-F238E27FC236}">
-                <a16:creationId xmlns:a16="http://schemas.microsoft.com/office/drawing/2014/main" id="{845DC760-6D24-0D5A-D2A1-E4DF274D830F}"/>
+                <a16:creationId xmlns:a16="http://schemas.microsoft.com/office/drawing/2014/main" id="{4D10F2F6-0D54-770E-4CF2-F2246C67145E}"/>
               </a:ext>
             </a:extLst>
           </p:cNvPr>
-          <p:cNvSpPr>
-            <a:spLocks noGrp="1"/>
-          </p:cNvSpPr>
-          <p:nvPr>
-            <p:ph idx="1"/>
-          </p:nvPr>
-        </p:nvSpPr>
-        <p:spPr/>
-        <p:txBody>
-          <a:bodyPr/>
-          <a:lstStyle/>
-          <a:p>
-            <a:r>
-              <a:rPr lang="en-US"/>
-              <a:t>SCREENSHOT OF RESTROSPECTIVE BOARD</a:t>
-            </a:r>
-          </a:p>
-        </p:txBody>
-      </p:sp>
+          <p:cNvPicPr>
+            <a:picLocks noChangeAspect="1"/>
+          </p:cNvPicPr>
+          <p:nvPr/>
+        </p:nvPicPr>
+        <p:blipFill>
+          <a:blip r:embed="rId2"/>
+          <a:stretch>
+            <a:fillRect/>
+          </a:stretch>
+        </p:blipFill>
+        <p:spPr>
+          <a:xfrm>
+            <a:off x="989401" y="734754"/>
+            <a:ext cx="10213199" cy="5977847"/>
+          </a:xfrm>
+          <a:prstGeom prst="rect">
+            <a:avLst/>
+          </a:prstGeom>
+        </p:spPr>
+      </p:pic>
     </p:spTree>
     <p:extLst>
       <p:ext uri="{BB962C8B-B14F-4D97-AF65-F5344CB8AC3E}">

</xml_diff>